<commit_message>
Reviewing some smoll modifications to the existing scripts
</commit_message>
<xml_diff>
--- a/summary/Final_Lab_Presentation_19th_March.pptx
+++ b/summary/Final_Lab_Presentation_19th_March.pptx
@@ -5408,13 +5408,17 @@
               <a:buSzPts val="1300"/>
             </a:pPr>
             <a:fld id="{00000000-1234-1234-1234-123412341234}" type="slidenum">
-              <a:rPr lang="en-IN"/>
+              <a:rPr lang="en-IN" smtClean="0"/>
               <a:pPr>
                 <a:buSzPts val="1300"/>
               </a:pPr>
               <a:t>2</a:t>
             </a:fld>
-            <a:endParaRPr/>
+            <a:r>
+              <a:rPr lang="en-IN" dirty="0"/>
+              <a:t>/8</a:t>
+            </a:r>
+            <a:endParaRPr dirty="0"/>
           </a:p>
         </p:txBody>
       </p:sp>
@@ -6111,13 +6115,17 @@
               <a:buSzPts val="1300"/>
             </a:pPr>
             <a:fld id="{00000000-1234-1234-1234-123412341234}" type="slidenum">
-              <a:rPr lang="en-IN"/>
+              <a:rPr lang="en-IN" smtClean="0"/>
               <a:pPr>
                 <a:buSzPts val="1300"/>
               </a:pPr>
               <a:t>3</a:t>
             </a:fld>
-            <a:endParaRPr/>
+            <a:r>
+              <a:rPr lang="en-IN" dirty="0"/>
+              <a:t>/8</a:t>
+            </a:r>
+            <a:endParaRPr dirty="0"/>
           </a:p>
         </p:txBody>
       </p:sp>
@@ -6749,13 +6757,17 @@
               <a:buSzPts val="1300"/>
             </a:pPr>
             <a:fld id="{00000000-1234-1234-1234-123412341234}" type="slidenum">
-              <a:rPr lang="en-IN"/>
+              <a:rPr lang="en-IN" smtClean="0"/>
               <a:pPr>
                 <a:buSzPts val="1300"/>
               </a:pPr>
               <a:t>4</a:t>
             </a:fld>
-            <a:endParaRPr/>
+            <a:r>
+              <a:rPr lang="en-IN" dirty="0"/>
+              <a:t>/8</a:t>
+            </a:r>
+            <a:endParaRPr dirty="0"/>
           </a:p>
         </p:txBody>
       </p:sp>
@@ -7295,13 +7307,17 @@
               <a:buSzPts val="1300"/>
             </a:pPr>
             <a:fld id="{00000000-1234-1234-1234-123412341234}" type="slidenum">
-              <a:rPr lang="en-IN"/>
+              <a:rPr lang="en-IN" smtClean="0"/>
               <a:pPr>
                 <a:buSzPts val="1300"/>
               </a:pPr>
               <a:t>5</a:t>
             </a:fld>
-            <a:endParaRPr/>
+            <a:r>
+              <a:rPr lang="en-IN" dirty="0"/>
+              <a:t>/8</a:t>
+            </a:r>
+            <a:endParaRPr dirty="0"/>
           </a:p>
         </p:txBody>
       </p:sp>
@@ -7985,13 +8001,17 @@
               <a:buSzPts val="1300"/>
             </a:pPr>
             <a:fld id="{00000000-1234-1234-1234-123412341234}" type="slidenum">
-              <a:rPr lang="en-IN"/>
+              <a:rPr lang="en-IN" smtClean="0"/>
               <a:pPr>
                 <a:buSzPts val="1300"/>
               </a:pPr>
               <a:t>6</a:t>
             </a:fld>
-            <a:endParaRPr/>
+            <a:r>
+              <a:rPr lang="en-IN" dirty="0"/>
+              <a:t>/8</a:t>
+            </a:r>
+            <a:endParaRPr dirty="0"/>
           </a:p>
         </p:txBody>
       </p:sp>
@@ -8825,13 +8845,17 @@
               <a:buSzPts val="1300"/>
             </a:pPr>
             <a:fld id="{00000000-1234-1234-1234-123412341234}" type="slidenum">
-              <a:rPr lang="en-IN"/>
+              <a:rPr lang="en-IN" smtClean="0"/>
               <a:pPr>
                 <a:buSzPts val="1300"/>
               </a:pPr>
               <a:t>7</a:t>
             </a:fld>
-            <a:endParaRPr/>
+            <a:r>
+              <a:rPr lang="en-IN" dirty="0"/>
+              <a:t>/8</a:t>
+            </a:r>
+            <a:endParaRPr dirty="0"/>
           </a:p>
         </p:txBody>
       </p:sp>
@@ -9497,12 +9521,16 @@
               <a:buSzPts val="1300"/>
             </a:pPr>
             <a:fld id="{00000000-1234-1234-1234-123412341234}" type="slidenum">
-              <a:rPr lang="en-IN"/>
+              <a:rPr lang="en-IN" smtClean="0"/>
               <a:pPr>
                 <a:buSzPts val="1300"/>
               </a:pPr>
               <a:t>8</a:t>
             </a:fld>
+            <a:r>
+              <a:rPr lang="en-IN" dirty="0"/>
+              <a:t>/8</a:t>
+            </a:r>
             <a:endParaRPr dirty="0"/>
           </a:p>
         </p:txBody>
@@ -9522,7 +9550,7 @@
         <p:spPr>
           <a:xfrm>
             <a:off x="273050" y="1720850"/>
-            <a:ext cx="11656604" cy="3780522"/>
+            <a:ext cx="11656604" cy="4611519"/>
           </a:xfrm>
           <a:prstGeom prst="rect">
             <a:avLst/>
@@ -9661,6 +9689,23 @@
                 <a:sym typeface="Arial"/>
               </a:rPr>
               <a:t> them for these two broad possibilities.</a:t>
+            </a:r>
+          </a:p>
+          <a:p>
+            <a:pPr marL="285750" indent="-285750">
+              <a:lnSpc>
+                <a:spcPct val="150000"/>
+              </a:lnSpc>
+              <a:buFontTx/>
+              <a:buChar char="-"/>
+            </a:pPr>
+            <a:r>
+              <a:rPr lang="en-US" dirty="0">
+                <a:latin typeface="Arial"/>
+                <a:cs typeface="Arial"/>
+                <a:sym typeface="Arial"/>
+              </a:rPr>
+              <a:t>If there does exist a signal of sorts, then the next step would be to look for whether this signal is present in the other two datasets</a:t>
             </a:r>
           </a:p>
         </p:txBody>

</xml_diff>

<commit_message>
Some changes I made while running stuff on 42
</commit_message>
<xml_diff>
--- a/summary/Final_Lab_Presentation_19th_March.pptx
+++ b/summary/Final_Lab_Presentation_19th_March.pptx
@@ -5,17 +5,18 @@
     <p:sldMasterId id="2147483648" r:id="rId1"/>
   </p:sldMasterIdLst>
   <p:notesMasterIdLst>
-    <p:notesMasterId r:id="rId10"/>
+    <p:notesMasterId r:id="rId11"/>
   </p:notesMasterIdLst>
   <p:sldIdLst>
-    <p:sldId id="256" r:id="rId2"/>
+    <p:sldId id="265" r:id="rId2"/>
     <p:sldId id="257" r:id="rId3"/>
     <p:sldId id="258" r:id="rId4"/>
     <p:sldId id="263" r:id="rId5"/>
     <p:sldId id="259" r:id="rId6"/>
     <p:sldId id="261" r:id="rId7"/>
     <p:sldId id="260" r:id="rId8"/>
-    <p:sldId id="262" r:id="rId9"/>
+    <p:sldId id="264" r:id="rId9"/>
+    <p:sldId id="262" r:id="rId10"/>
   </p:sldIdLst>
   <p:sldSz cx="12192000" cy="6858000"/>
   <p:notesSz cx="6858000" cy="9144000"/>
@@ -114,6 +115,11 @@
       </a:defRPr>
     </a:lvl9pPr>
   </p:defaultTextStyle>
+  <p:extLst>
+    <p:ext uri="{EFAFB233-063F-42B5-8137-9DF3F51BA10A}">
+      <p15:sldGuideLst xmlns:p15="http://schemas.microsoft.com/office/powerpoint/2012/main"/>
+    </p:ext>
+  </p:extLst>
 </p:presentation>
 </file>
 
@@ -199,7 +205,7 @@
           <a:p>
             <a:fld id="{2E912F67-98D9-4316-A19D-CCEB9F082AD0}" type="datetimeFigureOut">
               <a:rPr lang="en-IN" smtClean="0"/>
-              <a:t>17-03-2025</a:t>
+              <a:t>19-03-2025</a:t>
             </a:fld>
             <a:endParaRPr lang="en-IN"/>
           </a:p>
@@ -472,7 +478,13 @@
   <p:cSld>
     <p:spTree>
       <p:nvGrpSpPr>
-        <p:cNvPr id="1" name=""/>
+        <p:cNvPr id="1" name="">
+          <a:extLst>
+            <a:ext uri="{FF2B5EF4-FFF2-40B4-BE49-F238E27FC236}">
+              <a16:creationId xmlns:a16="http://schemas.microsoft.com/office/drawing/2014/main" id="{45DCFA40-9FCD-E3D2-D575-FC001AD2A1BE}"/>
+            </a:ext>
+          </a:extLst>
+        </p:cNvPr>
         <p:cNvGrpSpPr/>
         <p:nvPr/>
       </p:nvGrpSpPr>
@@ -486,7 +498,13 @@
       </p:grpSpPr>
       <p:sp>
         <p:nvSpPr>
-          <p:cNvPr id="2" name="Slide Image Placeholder 1"/>
+          <p:cNvPr id="2" name="Slide Image Placeholder 1">
+            <a:extLst>
+              <a:ext uri="{FF2B5EF4-FFF2-40B4-BE49-F238E27FC236}">
+                <a16:creationId xmlns:a16="http://schemas.microsoft.com/office/drawing/2014/main" id="{F97129A8-5950-4450-2D69-EECCF7CF6138}"/>
+              </a:ext>
+            </a:extLst>
+          </p:cNvPr>
           <p:cNvSpPr>
             <a:spLocks noGrp="1" noRot="1" noChangeAspect="1"/>
           </p:cNvSpPr>
@@ -498,7 +516,13 @@
       </p:sp>
       <p:sp>
         <p:nvSpPr>
-          <p:cNvPr id="3" name="Notes Placeholder 2"/>
+          <p:cNvPr id="3" name="Notes Placeholder 2">
+            <a:extLst>
+              <a:ext uri="{FF2B5EF4-FFF2-40B4-BE49-F238E27FC236}">
+                <a16:creationId xmlns:a16="http://schemas.microsoft.com/office/drawing/2014/main" id="{FE04B6AD-EDD0-6367-BB04-75A664F78E20}"/>
+              </a:ext>
+            </a:extLst>
+          </p:cNvPr>
           <p:cNvSpPr>
             <a:spLocks noGrp="1"/>
           </p:cNvSpPr>
@@ -511,13 +535,1591 @@
           <a:bodyPr/>
           <a:lstStyle/>
           <a:p>
-            <a:endParaRPr lang="en-IN"/>
-          </a:p>
-        </p:txBody>
-      </p:sp>
-      <p:sp>
-        <p:nvSpPr>
-          <p:cNvPr id="4" name="Slide Number Placeholder 3"/>
+            <a:pPr algn="just">
+              <a:spcAft>
+                <a:spcPts val="1125"/>
+              </a:spcAft>
+              <a:buNone/>
+            </a:pPr>
+            <a:r>
+              <a:rPr lang="en-IN" b="0" i="0" dirty="0">
+                <a:solidFill>
+                  <a:srgbClr val="000000"/>
+                </a:solidFill>
+                <a:effectLst/>
+                <a:latin typeface="Open Sans" panose="020F0502020204030204" pitchFamily="34" charset="0"/>
+              </a:rPr>
+              <a:t>Lorem ipsum </a:t>
+            </a:r>
+            <a:r>
+              <a:rPr lang="en-IN" b="0" i="0" dirty="0" err="1">
+                <a:solidFill>
+                  <a:srgbClr val="000000"/>
+                </a:solidFill>
+                <a:effectLst/>
+                <a:latin typeface="Open Sans" panose="020F0502020204030204" pitchFamily="34" charset="0"/>
+              </a:rPr>
+              <a:t>dolor</a:t>
+            </a:r>
+            <a:r>
+              <a:rPr lang="en-IN" b="0" i="0" dirty="0">
+                <a:solidFill>
+                  <a:srgbClr val="000000"/>
+                </a:solidFill>
+                <a:effectLst/>
+                <a:latin typeface="Open Sans" panose="020F0502020204030204" pitchFamily="34" charset="0"/>
+              </a:rPr>
+              <a:t> sit </a:t>
+            </a:r>
+            <a:r>
+              <a:rPr lang="en-IN" b="0" i="0" dirty="0" err="1">
+                <a:solidFill>
+                  <a:srgbClr val="000000"/>
+                </a:solidFill>
+                <a:effectLst/>
+                <a:latin typeface="Open Sans" panose="020F0502020204030204" pitchFamily="34" charset="0"/>
+              </a:rPr>
+              <a:t>amet</a:t>
+            </a:r>
+            <a:r>
+              <a:rPr lang="en-IN" b="0" i="0" dirty="0">
+                <a:solidFill>
+                  <a:srgbClr val="000000"/>
+                </a:solidFill>
+                <a:effectLst/>
+                <a:latin typeface="Open Sans" panose="020F0502020204030204" pitchFamily="34" charset="0"/>
+              </a:rPr>
+              <a:t>, </a:t>
+            </a:r>
+            <a:r>
+              <a:rPr lang="en-IN" b="0" i="0" dirty="0" err="1">
+                <a:solidFill>
+                  <a:srgbClr val="000000"/>
+                </a:solidFill>
+                <a:effectLst/>
+                <a:latin typeface="Open Sans" panose="020F0502020204030204" pitchFamily="34" charset="0"/>
+              </a:rPr>
+              <a:t>consectetur</a:t>
+            </a:r>
+            <a:r>
+              <a:rPr lang="en-IN" b="0" i="0" dirty="0">
+                <a:solidFill>
+                  <a:srgbClr val="000000"/>
+                </a:solidFill>
+                <a:effectLst/>
+                <a:latin typeface="Open Sans" panose="020F0502020204030204" pitchFamily="34" charset="0"/>
+              </a:rPr>
+              <a:t> </a:t>
+            </a:r>
+            <a:r>
+              <a:rPr lang="en-IN" b="0" i="0" dirty="0" err="1">
+                <a:solidFill>
+                  <a:srgbClr val="000000"/>
+                </a:solidFill>
+                <a:effectLst/>
+                <a:latin typeface="Open Sans" panose="020F0502020204030204" pitchFamily="34" charset="0"/>
+              </a:rPr>
+              <a:t>adipiscing</a:t>
+            </a:r>
+            <a:r>
+              <a:rPr lang="en-IN" b="0" i="0" dirty="0">
+                <a:solidFill>
+                  <a:srgbClr val="000000"/>
+                </a:solidFill>
+                <a:effectLst/>
+                <a:latin typeface="Open Sans" panose="020F0502020204030204" pitchFamily="34" charset="0"/>
+              </a:rPr>
+              <a:t> </a:t>
+            </a:r>
+            <a:r>
+              <a:rPr lang="en-IN" b="0" i="0" dirty="0" err="1">
+                <a:solidFill>
+                  <a:srgbClr val="000000"/>
+                </a:solidFill>
+                <a:effectLst/>
+                <a:latin typeface="Open Sans" panose="020F0502020204030204" pitchFamily="34" charset="0"/>
+              </a:rPr>
+              <a:t>elit</a:t>
+            </a:r>
+            <a:r>
+              <a:rPr lang="en-IN" b="0" i="0" dirty="0">
+                <a:solidFill>
+                  <a:srgbClr val="000000"/>
+                </a:solidFill>
+                <a:effectLst/>
+                <a:latin typeface="Open Sans" panose="020F0502020204030204" pitchFamily="34" charset="0"/>
+              </a:rPr>
+              <a:t>. Sed sit </a:t>
+            </a:r>
+            <a:r>
+              <a:rPr lang="en-IN" b="0" i="0" dirty="0" err="1">
+                <a:solidFill>
+                  <a:srgbClr val="000000"/>
+                </a:solidFill>
+                <a:effectLst/>
+                <a:latin typeface="Open Sans" panose="020F0502020204030204" pitchFamily="34" charset="0"/>
+              </a:rPr>
+              <a:t>amet</a:t>
+            </a:r>
+            <a:r>
+              <a:rPr lang="en-IN" b="0" i="0" dirty="0">
+                <a:solidFill>
+                  <a:srgbClr val="000000"/>
+                </a:solidFill>
+                <a:effectLst/>
+                <a:latin typeface="Open Sans" panose="020F0502020204030204" pitchFamily="34" charset="0"/>
+              </a:rPr>
+              <a:t> </a:t>
+            </a:r>
+            <a:r>
+              <a:rPr lang="en-IN" b="0" i="0" dirty="0" err="1">
+                <a:solidFill>
+                  <a:srgbClr val="000000"/>
+                </a:solidFill>
+                <a:effectLst/>
+                <a:latin typeface="Open Sans" panose="020F0502020204030204" pitchFamily="34" charset="0"/>
+              </a:rPr>
+              <a:t>condimentum</a:t>
+            </a:r>
+            <a:r>
+              <a:rPr lang="en-IN" b="0" i="0" dirty="0">
+                <a:solidFill>
+                  <a:srgbClr val="000000"/>
+                </a:solidFill>
+                <a:effectLst/>
+                <a:latin typeface="Open Sans" panose="020F0502020204030204" pitchFamily="34" charset="0"/>
+              </a:rPr>
+              <a:t> </a:t>
+            </a:r>
+            <a:r>
+              <a:rPr lang="en-IN" b="0" i="0" dirty="0" err="1">
+                <a:solidFill>
+                  <a:srgbClr val="000000"/>
+                </a:solidFill>
+                <a:effectLst/>
+                <a:latin typeface="Open Sans" panose="020F0502020204030204" pitchFamily="34" charset="0"/>
+              </a:rPr>
+              <a:t>massa</a:t>
+            </a:r>
+            <a:r>
+              <a:rPr lang="en-IN" b="0" i="0" dirty="0">
+                <a:solidFill>
+                  <a:srgbClr val="000000"/>
+                </a:solidFill>
+                <a:effectLst/>
+                <a:latin typeface="Open Sans" panose="020F0502020204030204" pitchFamily="34" charset="0"/>
+              </a:rPr>
+              <a:t>, at porta magna. </a:t>
+            </a:r>
+            <a:r>
+              <a:rPr lang="en-IN" b="0" i="0" dirty="0" err="1">
+                <a:solidFill>
+                  <a:srgbClr val="000000"/>
+                </a:solidFill>
+                <a:effectLst/>
+                <a:latin typeface="Open Sans" panose="020F0502020204030204" pitchFamily="34" charset="0"/>
+              </a:rPr>
+              <a:t>Quisque</a:t>
+            </a:r>
+            <a:r>
+              <a:rPr lang="en-IN" b="0" i="0" dirty="0">
+                <a:solidFill>
+                  <a:srgbClr val="000000"/>
+                </a:solidFill>
+                <a:effectLst/>
+                <a:latin typeface="Open Sans" panose="020F0502020204030204" pitchFamily="34" charset="0"/>
+              </a:rPr>
+              <a:t> lacinia </a:t>
+            </a:r>
+            <a:r>
+              <a:rPr lang="en-IN" b="0" i="0" dirty="0" err="1">
+                <a:solidFill>
+                  <a:srgbClr val="000000"/>
+                </a:solidFill>
+                <a:effectLst/>
+                <a:latin typeface="Open Sans" panose="020F0502020204030204" pitchFamily="34" charset="0"/>
+              </a:rPr>
+              <a:t>dapibus</a:t>
+            </a:r>
+            <a:r>
+              <a:rPr lang="en-IN" b="0" i="0" dirty="0">
+                <a:solidFill>
+                  <a:srgbClr val="000000"/>
+                </a:solidFill>
+                <a:effectLst/>
+                <a:latin typeface="Open Sans" panose="020F0502020204030204" pitchFamily="34" charset="0"/>
+              </a:rPr>
+              <a:t> </a:t>
+            </a:r>
+            <a:r>
+              <a:rPr lang="en-IN" b="0" i="0" dirty="0" err="1">
+                <a:solidFill>
+                  <a:srgbClr val="000000"/>
+                </a:solidFill>
+                <a:effectLst/>
+                <a:latin typeface="Open Sans" panose="020F0502020204030204" pitchFamily="34" charset="0"/>
+              </a:rPr>
+              <a:t>risus</a:t>
+            </a:r>
+            <a:r>
+              <a:rPr lang="en-IN" b="0" i="0" dirty="0">
+                <a:solidFill>
+                  <a:srgbClr val="000000"/>
+                </a:solidFill>
+                <a:effectLst/>
+                <a:latin typeface="Open Sans" panose="020F0502020204030204" pitchFamily="34" charset="0"/>
+              </a:rPr>
+              <a:t> non </a:t>
+            </a:r>
+            <a:r>
+              <a:rPr lang="en-IN" b="0" i="0" dirty="0" err="1">
+                <a:solidFill>
+                  <a:srgbClr val="000000"/>
+                </a:solidFill>
+                <a:effectLst/>
+                <a:latin typeface="Open Sans" panose="020F0502020204030204" pitchFamily="34" charset="0"/>
+              </a:rPr>
+              <a:t>vulputate</a:t>
+            </a:r>
+            <a:r>
+              <a:rPr lang="en-IN" b="0" i="0" dirty="0">
+                <a:solidFill>
+                  <a:srgbClr val="000000"/>
+                </a:solidFill>
+                <a:effectLst/>
+                <a:latin typeface="Open Sans" panose="020F0502020204030204" pitchFamily="34" charset="0"/>
+              </a:rPr>
+              <a:t>. </a:t>
+            </a:r>
+            <a:r>
+              <a:rPr lang="en-IN" b="0" i="0" dirty="0" err="1">
+                <a:solidFill>
+                  <a:srgbClr val="000000"/>
+                </a:solidFill>
+                <a:effectLst/>
+                <a:latin typeface="Open Sans" panose="020F0502020204030204" pitchFamily="34" charset="0"/>
+              </a:rPr>
+              <a:t>Phasellus</a:t>
+            </a:r>
+            <a:r>
+              <a:rPr lang="en-IN" b="0" i="0" dirty="0">
+                <a:solidFill>
+                  <a:srgbClr val="000000"/>
+                </a:solidFill>
+                <a:effectLst/>
+                <a:latin typeface="Open Sans" panose="020F0502020204030204" pitchFamily="34" charset="0"/>
+              </a:rPr>
+              <a:t> </a:t>
+            </a:r>
+            <a:r>
+              <a:rPr lang="en-IN" b="0" i="0" dirty="0" err="1">
+                <a:solidFill>
+                  <a:srgbClr val="000000"/>
+                </a:solidFill>
+                <a:effectLst/>
+                <a:latin typeface="Open Sans" panose="020F0502020204030204" pitchFamily="34" charset="0"/>
+              </a:rPr>
+              <a:t>vel</a:t>
+            </a:r>
+            <a:r>
+              <a:rPr lang="en-IN" b="0" i="0" dirty="0">
+                <a:solidFill>
+                  <a:srgbClr val="000000"/>
+                </a:solidFill>
+                <a:effectLst/>
+                <a:latin typeface="Open Sans" panose="020F0502020204030204" pitchFamily="34" charset="0"/>
+              </a:rPr>
+              <a:t> </a:t>
+            </a:r>
+            <a:r>
+              <a:rPr lang="en-IN" b="0" i="0" dirty="0" err="1">
+                <a:solidFill>
+                  <a:srgbClr val="000000"/>
+                </a:solidFill>
+                <a:effectLst/>
+                <a:latin typeface="Open Sans" panose="020F0502020204030204" pitchFamily="34" charset="0"/>
+              </a:rPr>
+              <a:t>viverra</a:t>
+            </a:r>
+            <a:r>
+              <a:rPr lang="en-IN" b="0" i="0" dirty="0">
+                <a:solidFill>
+                  <a:srgbClr val="000000"/>
+                </a:solidFill>
+                <a:effectLst/>
+                <a:latin typeface="Open Sans" panose="020F0502020204030204" pitchFamily="34" charset="0"/>
+              </a:rPr>
+              <a:t> </a:t>
+            </a:r>
+            <a:r>
+              <a:rPr lang="en-IN" b="0" i="0" dirty="0" err="1">
+                <a:solidFill>
+                  <a:srgbClr val="000000"/>
+                </a:solidFill>
+                <a:effectLst/>
+                <a:latin typeface="Open Sans" panose="020F0502020204030204" pitchFamily="34" charset="0"/>
+              </a:rPr>
+              <a:t>leo</a:t>
+            </a:r>
+            <a:r>
+              <a:rPr lang="en-IN" b="0" i="0" dirty="0">
+                <a:solidFill>
+                  <a:srgbClr val="000000"/>
+                </a:solidFill>
+                <a:effectLst/>
+                <a:latin typeface="Open Sans" panose="020F0502020204030204" pitchFamily="34" charset="0"/>
+              </a:rPr>
+              <a:t>. </a:t>
+            </a:r>
+            <a:r>
+              <a:rPr lang="en-IN" b="0" i="0" dirty="0" err="1">
+                <a:solidFill>
+                  <a:srgbClr val="000000"/>
+                </a:solidFill>
+                <a:effectLst/>
+                <a:latin typeface="Open Sans" panose="020F0502020204030204" pitchFamily="34" charset="0"/>
+              </a:rPr>
+              <a:t>Phasellus</a:t>
+            </a:r>
+            <a:r>
+              <a:rPr lang="en-IN" b="0" i="0" dirty="0">
+                <a:solidFill>
+                  <a:srgbClr val="000000"/>
+                </a:solidFill>
+                <a:effectLst/>
+                <a:latin typeface="Open Sans" panose="020F0502020204030204" pitchFamily="34" charset="0"/>
+              </a:rPr>
+              <a:t> </a:t>
+            </a:r>
+            <a:r>
+              <a:rPr lang="en-IN" b="0" i="0" dirty="0" err="1">
+                <a:solidFill>
+                  <a:srgbClr val="000000"/>
+                </a:solidFill>
+                <a:effectLst/>
+                <a:latin typeface="Open Sans" panose="020F0502020204030204" pitchFamily="34" charset="0"/>
+              </a:rPr>
+              <a:t>varius</a:t>
+            </a:r>
+            <a:r>
+              <a:rPr lang="en-IN" b="0" i="0" dirty="0">
+                <a:solidFill>
+                  <a:srgbClr val="000000"/>
+                </a:solidFill>
+                <a:effectLst/>
+                <a:latin typeface="Open Sans" panose="020F0502020204030204" pitchFamily="34" charset="0"/>
+              </a:rPr>
+              <a:t> </a:t>
+            </a:r>
+            <a:r>
+              <a:rPr lang="en-IN" b="0" i="0" dirty="0" err="1">
+                <a:solidFill>
+                  <a:srgbClr val="000000"/>
+                </a:solidFill>
+                <a:effectLst/>
+                <a:latin typeface="Open Sans" panose="020F0502020204030204" pitchFamily="34" charset="0"/>
+              </a:rPr>
+              <a:t>odio</a:t>
+            </a:r>
+            <a:r>
+              <a:rPr lang="en-IN" b="0" i="0" dirty="0">
+                <a:solidFill>
+                  <a:srgbClr val="000000"/>
+                </a:solidFill>
+                <a:effectLst/>
+                <a:latin typeface="Open Sans" panose="020F0502020204030204" pitchFamily="34" charset="0"/>
+              </a:rPr>
+              <a:t> </a:t>
+            </a:r>
+            <a:r>
+              <a:rPr lang="en-IN" b="0" i="0" dirty="0" err="1">
+                <a:solidFill>
+                  <a:srgbClr val="000000"/>
+                </a:solidFill>
+                <a:effectLst/>
+                <a:latin typeface="Open Sans" panose="020F0502020204030204" pitchFamily="34" charset="0"/>
+              </a:rPr>
+              <a:t>rhoncus</a:t>
+            </a:r>
+            <a:r>
+              <a:rPr lang="en-IN" b="0" i="0" dirty="0">
+                <a:solidFill>
+                  <a:srgbClr val="000000"/>
+                </a:solidFill>
+                <a:effectLst/>
+                <a:latin typeface="Open Sans" panose="020F0502020204030204" pitchFamily="34" charset="0"/>
+              </a:rPr>
+              <a:t> </a:t>
+            </a:r>
+            <a:r>
+              <a:rPr lang="en-IN" b="0" i="0" dirty="0" err="1">
+                <a:solidFill>
+                  <a:srgbClr val="000000"/>
+                </a:solidFill>
+                <a:effectLst/>
+                <a:latin typeface="Open Sans" panose="020F0502020204030204" pitchFamily="34" charset="0"/>
+              </a:rPr>
+              <a:t>risus</a:t>
+            </a:r>
+            <a:r>
+              <a:rPr lang="en-IN" b="0" i="0" dirty="0">
+                <a:solidFill>
+                  <a:srgbClr val="000000"/>
+                </a:solidFill>
+                <a:effectLst/>
+                <a:latin typeface="Open Sans" panose="020F0502020204030204" pitchFamily="34" charset="0"/>
+              </a:rPr>
+              <a:t> </a:t>
+            </a:r>
+            <a:r>
+              <a:rPr lang="en-IN" b="0" i="0" dirty="0" err="1">
+                <a:solidFill>
+                  <a:srgbClr val="000000"/>
+                </a:solidFill>
+                <a:effectLst/>
+                <a:latin typeface="Open Sans" panose="020F0502020204030204" pitchFamily="34" charset="0"/>
+              </a:rPr>
+              <a:t>lobortis</a:t>
+            </a:r>
+            <a:r>
+              <a:rPr lang="en-IN" b="0" i="0" dirty="0">
+                <a:solidFill>
+                  <a:srgbClr val="000000"/>
+                </a:solidFill>
+                <a:effectLst/>
+                <a:latin typeface="Open Sans" panose="020F0502020204030204" pitchFamily="34" charset="0"/>
+              </a:rPr>
+              <a:t>, at </a:t>
+            </a:r>
+            <a:r>
+              <a:rPr lang="en-IN" b="0" i="0" dirty="0" err="1">
+                <a:solidFill>
+                  <a:srgbClr val="000000"/>
+                </a:solidFill>
+                <a:effectLst/>
+                <a:latin typeface="Open Sans" panose="020F0502020204030204" pitchFamily="34" charset="0"/>
+              </a:rPr>
+              <a:t>facilisis</a:t>
+            </a:r>
+            <a:r>
+              <a:rPr lang="en-IN" b="0" i="0" dirty="0">
+                <a:solidFill>
+                  <a:srgbClr val="000000"/>
+                </a:solidFill>
+                <a:effectLst/>
+                <a:latin typeface="Open Sans" panose="020F0502020204030204" pitchFamily="34" charset="0"/>
+              </a:rPr>
+              <a:t> </a:t>
+            </a:r>
+            <a:r>
+              <a:rPr lang="en-IN" b="0" i="0" dirty="0" err="1">
+                <a:solidFill>
+                  <a:srgbClr val="000000"/>
+                </a:solidFill>
+                <a:effectLst/>
+                <a:latin typeface="Open Sans" panose="020F0502020204030204" pitchFamily="34" charset="0"/>
+              </a:rPr>
+              <a:t>tortor</a:t>
+            </a:r>
+            <a:r>
+              <a:rPr lang="en-IN" b="0" i="0" dirty="0">
+                <a:solidFill>
+                  <a:srgbClr val="000000"/>
+                </a:solidFill>
+                <a:effectLst/>
+                <a:latin typeface="Open Sans" panose="020F0502020204030204" pitchFamily="34" charset="0"/>
+              </a:rPr>
+              <a:t> </a:t>
+            </a:r>
+            <a:r>
+              <a:rPr lang="en-IN" b="0" i="0" dirty="0" err="1">
+                <a:solidFill>
+                  <a:srgbClr val="000000"/>
+                </a:solidFill>
+                <a:effectLst/>
+                <a:latin typeface="Open Sans" panose="020F0502020204030204" pitchFamily="34" charset="0"/>
+              </a:rPr>
+              <a:t>porttitor</a:t>
+            </a:r>
+            <a:r>
+              <a:rPr lang="en-IN" b="0" i="0" dirty="0">
+                <a:solidFill>
+                  <a:srgbClr val="000000"/>
+                </a:solidFill>
+                <a:effectLst/>
+                <a:latin typeface="Open Sans" panose="020F0502020204030204" pitchFamily="34" charset="0"/>
+              </a:rPr>
+              <a:t>. In id </a:t>
+            </a:r>
+            <a:r>
+              <a:rPr lang="en-IN" b="0" i="0" dirty="0" err="1">
+                <a:solidFill>
+                  <a:srgbClr val="000000"/>
+                </a:solidFill>
+                <a:effectLst/>
+                <a:latin typeface="Open Sans" panose="020F0502020204030204" pitchFamily="34" charset="0"/>
+              </a:rPr>
+              <a:t>pellentesque</a:t>
+            </a:r>
+            <a:r>
+              <a:rPr lang="en-IN" b="0" i="0" dirty="0">
+                <a:solidFill>
+                  <a:srgbClr val="000000"/>
+                </a:solidFill>
+                <a:effectLst/>
+                <a:latin typeface="Open Sans" panose="020F0502020204030204" pitchFamily="34" charset="0"/>
+              </a:rPr>
+              <a:t> </a:t>
+            </a:r>
+            <a:r>
+              <a:rPr lang="en-IN" b="0" i="0" dirty="0" err="1">
+                <a:solidFill>
+                  <a:srgbClr val="000000"/>
+                </a:solidFill>
+                <a:effectLst/>
+                <a:latin typeface="Open Sans" panose="020F0502020204030204" pitchFamily="34" charset="0"/>
+              </a:rPr>
+              <a:t>sapien</a:t>
+            </a:r>
+            <a:r>
+              <a:rPr lang="en-IN" b="0" i="0" dirty="0">
+                <a:solidFill>
+                  <a:srgbClr val="000000"/>
+                </a:solidFill>
+                <a:effectLst/>
+                <a:latin typeface="Open Sans" panose="020F0502020204030204" pitchFamily="34" charset="0"/>
+              </a:rPr>
+              <a:t>, </a:t>
+            </a:r>
+            <a:r>
+              <a:rPr lang="en-IN" b="0" i="0" dirty="0" err="1">
+                <a:solidFill>
+                  <a:srgbClr val="000000"/>
+                </a:solidFill>
+                <a:effectLst/>
+                <a:latin typeface="Open Sans" panose="020F0502020204030204" pitchFamily="34" charset="0"/>
+              </a:rPr>
+              <a:t>sed</a:t>
+            </a:r>
+            <a:r>
+              <a:rPr lang="en-IN" b="0" i="0" dirty="0">
+                <a:solidFill>
+                  <a:srgbClr val="000000"/>
+                </a:solidFill>
+                <a:effectLst/>
+                <a:latin typeface="Open Sans" panose="020F0502020204030204" pitchFamily="34" charset="0"/>
+              </a:rPr>
+              <a:t> auctor </a:t>
+            </a:r>
+            <a:r>
+              <a:rPr lang="en-IN" b="0" i="0" dirty="0" err="1">
+                <a:solidFill>
+                  <a:srgbClr val="000000"/>
+                </a:solidFill>
+                <a:effectLst/>
+                <a:latin typeface="Open Sans" panose="020F0502020204030204" pitchFamily="34" charset="0"/>
+              </a:rPr>
+              <a:t>risus</a:t>
+            </a:r>
+            <a:r>
+              <a:rPr lang="en-IN" b="0" i="0" dirty="0">
+                <a:solidFill>
+                  <a:srgbClr val="000000"/>
+                </a:solidFill>
+                <a:effectLst/>
+                <a:latin typeface="Open Sans" panose="020F0502020204030204" pitchFamily="34" charset="0"/>
+              </a:rPr>
+              <a:t>. </a:t>
+            </a:r>
+            <a:r>
+              <a:rPr lang="en-IN" b="0" i="0" dirty="0" err="1">
+                <a:solidFill>
+                  <a:srgbClr val="000000"/>
+                </a:solidFill>
+                <a:effectLst/>
+                <a:latin typeface="Open Sans" panose="020F0502020204030204" pitchFamily="34" charset="0"/>
+              </a:rPr>
+              <a:t>Quisque</a:t>
+            </a:r>
+            <a:r>
+              <a:rPr lang="en-IN" b="0" i="0" dirty="0">
+                <a:solidFill>
+                  <a:srgbClr val="000000"/>
+                </a:solidFill>
+                <a:effectLst/>
+                <a:latin typeface="Open Sans" panose="020F0502020204030204" pitchFamily="34" charset="0"/>
+              </a:rPr>
+              <a:t> </a:t>
+            </a:r>
+            <a:r>
+              <a:rPr lang="en-IN" b="0" i="0" dirty="0" err="1">
+                <a:solidFill>
+                  <a:srgbClr val="000000"/>
+                </a:solidFill>
+                <a:effectLst/>
+                <a:latin typeface="Open Sans" panose="020F0502020204030204" pitchFamily="34" charset="0"/>
+              </a:rPr>
+              <a:t>consectetur</a:t>
+            </a:r>
+            <a:r>
+              <a:rPr lang="en-IN" b="0" i="0" dirty="0">
+                <a:solidFill>
+                  <a:srgbClr val="000000"/>
+                </a:solidFill>
+                <a:effectLst/>
+                <a:latin typeface="Open Sans" panose="020F0502020204030204" pitchFamily="34" charset="0"/>
+              </a:rPr>
+              <a:t> mi ac </a:t>
+            </a:r>
+            <a:r>
+              <a:rPr lang="en-IN" b="0" i="0" dirty="0" err="1">
+                <a:solidFill>
+                  <a:srgbClr val="000000"/>
+                </a:solidFill>
+                <a:effectLst/>
+                <a:latin typeface="Open Sans" panose="020F0502020204030204" pitchFamily="34" charset="0"/>
+              </a:rPr>
+              <a:t>ultrices</a:t>
+            </a:r>
+            <a:r>
+              <a:rPr lang="en-IN" b="0" i="0" dirty="0">
+                <a:solidFill>
+                  <a:srgbClr val="000000"/>
+                </a:solidFill>
+                <a:effectLst/>
+                <a:latin typeface="Open Sans" panose="020F0502020204030204" pitchFamily="34" charset="0"/>
+              </a:rPr>
+              <a:t> </a:t>
+            </a:r>
+            <a:r>
+              <a:rPr lang="en-IN" b="0" i="0" dirty="0" err="1">
+                <a:solidFill>
+                  <a:srgbClr val="000000"/>
+                </a:solidFill>
+                <a:effectLst/>
+                <a:latin typeface="Open Sans" panose="020F0502020204030204" pitchFamily="34" charset="0"/>
+              </a:rPr>
+              <a:t>congue</a:t>
+            </a:r>
+            <a:r>
+              <a:rPr lang="en-IN" b="0" i="0" dirty="0">
+                <a:solidFill>
+                  <a:srgbClr val="000000"/>
+                </a:solidFill>
+                <a:effectLst/>
+                <a:latin typeface="Open Sans" panose="020F0502020204030204" pitchFamily="34" charset="0"/>
+              </a:rPr>
+              <a:t>. </a:t>
+            </a:r>
+            <a:r>
+              <a:rPr lang="en-IN" b="0" i="0" dirty="0" err="1">
+                <a:solidFill>
+                  <a:srgbClr val="000000"/>
+                </a:solidFill>
+                <a:effectLst/>
+                <a:latin typeface="Open Sans" panose="020F0502020204030204" pitchFamily="34" charset="0"/>
+              </a:rPr>
+              <a:t>Suspendisse</a:t>
+            </a:r>
+            <a:r>
+              <a:rPr lang="en-IN" b="0" i="0" dirty="0">
+                <a:solidFill>
+                  <a:srgbClr val="000000"/>
+                </a:solidFill>
+                <a:effectLst/>
+                <a:latin typeface="Open Sans" panose="020F0502020204030204" pitchFamily="34" charset="0"/>
+              </a:rPr>
+              <a:t> nisi </a:t>
+            </a:r>
+            <a:r>
+              <a:rPr lang="en-IN" b="0" i="0" dirty="0" err="1">
+                <a:solidFill>
+                  <a:srgbClr val="000000"/>
+                </a:solidFill>
+                <a:effectLst/>
+                <a:latin typeface="Open Sans" panose="020F0502020204030204" pitchFamily="34" charset="0"/>
+              </a:rPr>
+              <a:t>est</a:t>
+            </a:r>
+            <a:r>
+              <a:rPr lang="en-IN" b="0" i="0" dirty="0">
+                <a:solidFill>
+                  <a:srgbClr val="000000"/>
+                </a:solidFill>
+                <a:effectLst/>
+                <a:latin typeface="Open Sans" panose="020F0502020204030204" pitchFamily="34" charset="0"/>
+              </a:rPr>
+              <a:t>, </a:t>
+            </a:r>
+            <a:r>
+              <a:rPr lang="en-IN" b="0" i="0" dirty="0" err="1">
+                <a:solidFill>
+                  <a:srgbClr val="000000"/>
+                </a:solidFill>
+                <a:effectLst/>
+                <a:latin typeface="Open Sans" panose="020F0502020204030204" pitchFamily="34" charset="0"/>
+              </a:rPr>
+              <a:t>suscipit</a:t>
+            </a:r>
+            <a:r>
+              <a:rPr lang="en-IN" b="0" i="0" dirty="0">
+                <a:solidFill>
+                  <a:srgbClr val="000000"/>
+                </a:solidFill>
+                <a:effectLst/>
+                <a:latin typeface="Open Sans" panose="020F0502020204030204" pitchFamily="34" charset="0"/>
+              </a:rPr>
+              <a:t> non </a:t>
+            </a:r>
+            <a:r>
+              <a:rPr lang="en-IN" b="0" i="0" dirty="0" err="1">
+                <a:solidFill>
+                  <a:srgbClr val="000000"/>
+                </a:solidFill>
+                <a:effectLst/>
+                <a:latin typeface="Open Sans" panose="020F0502020204030204" pitchFamily="34" charset="0"/>
+              </a:rPr>
+              <a:t>molestie</a:t>
+            </a:r>
+            <a:r>
+              <a:rPr lang="en-IN" b="0" i="0" dirty="0">
+                <a:solidFill>
+                  <a:srgbClr val="000000"/>
+                </a:solidFill>
+                <a:effectLst/>
+                <a:latin typeface="Open Sans" panose="020F0502020204030204" pitchFamily="34" charset="0"/>
+              </a:rPr>
+              <a:t> et, </a:t>
+            </a:r>
+            <a:r>
+              <a:rPr lang="en-IN" b="0" i="0" dirty="0" err="1">
+                <a:solidFill>
+                  <a:srgbClr val="000000"/>
+                </a:solidFill>
+                <a:effectLst/>
+                <a:latin typeface="Open Sans" panose="020F0502020204030204" pitchFamily="34" charset="0"/>
+              </a:rPr>
+              <a:t>malesuada</a:t>
+            </a:r>
+            <a:r>
+              <a:rPr lang="en-IN" b="0" i="0" dirty="0">
+                <a:solidFill>
+                  <a:srgbClr val="000000"/>
+                </a:solidFill>
+                <a:effectLst/>
+                <a:latin typeface="Open Sans" panose="020F0502020204030204" pitchFamily="34" charset="0"/>
+              </a:rPr>
+              <a:t> </a:t>
+            </a:r>
+            <a:r>
+              <a:rPr lang="en-IN" b="0" i="0" dirty="0" err="1">
+                <a:solidFill>
+                  <a:srgbClr val="000000"/>
+                </a:solidFill>
+                <a:effectLst/>
+                <a:latin typeface="Open Sans" panose="020F0502020204030204" pitchFamily="34" charset="0"/>
+              </a:rPr>
+              <a:t>tincidunt</a:t>
+            </a:r>
+            <a:r>
+              <a:rPr lang="en-IN" b="0" i="0" dirty="0">
+                <a:solidFill>
+                  <a:srgbClr val="000000"/>
+                </a:solidFill>
+                <a:effectLst/>
+                <a:latin typeface="Open Sans" panose="020F0502020204030204" pitchFamily="34" charset="0"/>
+              </a:rPr>
+              <a:t> libero. Donec </a:t>
+            </a:r>
+            <a:r>
+              <a:rPr lang="en-IN" b="0" i="0" dirty="0" err="1">
+                <a:solidFill>
+                  <a:srgbClr val="000000"/>
+                </a:solidFill>
+                <a:effectLst/>
+                <a:latin typeface="Open Sans" panose="020F0502020204030204" pitchFamily="34" charset="0"/>
+              </a:rPr>
+              <a:t>congue</a:t>
+            </a:r>
+            <a:r>
+              <a:rPr lang="en-IN" b="0" i="0" dirty="0">
+                <a:solidFill>
+                  <a:srgbClr val="000000"/>
+                </a:solidFill>
+                <a:effectLst/>
+                <a:latin typeface="Open Sans" panose="020F0502020204030204" pitchFamily="34" charset="0"/>
+              </a:rPr>
+              <a:t> </a:t>
+            </a:r>
+            <a:r>
+              <a:rPr lang="en-IN" b="0" i="0" dirty="0" err="1">
+                <a:solidFill>
+                  <a:srgbClr val="000000"/>
+                </a:solidFill>
+                <a:effectLst/>
+                <a:latin typeface="Open Sans" panose="020F0502020204030204" pitchFamily="34" charset="0"/>
+              </a:rPr>
+              <a:t>diam</a:t>
+            </a:r>
+            <a:r>
+              <a:rPr lang="en-IN" b="0" i="0" dirty="0">
+                <a:solidFill>
+                  <a:srgbClr val="000000"/>
+                </a:solidFill>
+                <a:effectLst/>
+                <a:latin typeface="Open Sans" panose="020F0502020204030204" pitchFamily="34" charset="0"/>
+              </a:rPr>
+              <a:t> ac </a:t>
+            </a:r>
+            <a:r>
+              <a:rPr lang="en-IN" b="0" i="0" dirty="0" err="1">
+                <a:solidFill>
+                  <a:srgbClr val="000000"/>
+                </a:solidFill>
+                <a:effectLst/>
+                <a:latin typeface="Open Sans" panose="020F0502020204030204" pitchFamily="34" charset="0"/>
+              </a:rPr>
+              <a:t>diam</a:t>
+            </a:r>
+            <a:r>
+              <a:rPr lang="en-IN" b="0" i="0" dirty="0">
+                <a:solidFill>
+                  <a:srgbClr val="000000"/>
+                </a:solidFill>
+                <a:effectLst/>
+                <a:latin typeface="Open Sans" panose="020F0502020204030204" pitchFamily="34" charset="0"/>
+              </a:rPr>
+              <a:t> </a:t>
+            </a:r>
+            <a:r>
+              <a:rPr lang="en-IN" b="0" i="0" dirty="0" err="1">
+                <a:solidFill>
+                  <a:srgbClr val="000000"/>
+                </a:solidFill>
+                <a:effectLst/>
+                <a:latin typeface="Open Sans" panose="020F0502020204030204" pitchFamily="34" charset="0"/>
+              </a:rPr>
+              <a:t>porttitor</a:t>
+            </a:r>
+            <a:r>
+              <a:rPr lang="en-IN" b="0" i="0" dirty="0">
+                <a:solidFill>
+                  <a:srgbClr val="000000"/>
+                </a:solidFill>
+                <a:effectLst/>
+                <a:latin typeface="Open Sans" panose="020F0502020204030204" pitchFamily="34" charset="0"/>
+              </a:rPr>
+              <a:t>, non </a:t>
+            </a:r>
+            <a:r>
+              <a:rPr lang="en-IN" b="0" i="0" dirty="0" err="1">
+                <a:solidFill>
+                  <a:srgbClr val="000000"/>
+                </a:solidFill>
+                <a:effectLst/>
+                <a:latin typeface="Open Sans" panose="020F0502020204030204" pitchFamily="34" charset="0"/>
+              </a:rPr>
+              <a:t>ullamcorper</a:t>
+            </a:r>
+            <a:r>
+              <a:rPr lang="en-IN" b="0" i="0" dirty="0">
+                <a:solidFill>
+                  <a:srgbClr val="000000"/>
+                </a:solidFill>
+                <a:effectLst/>
+                <a:latin typeface="Open Sans" panose="020F0502020204030204" pitchFamily="34" charset="0"/>
+              </a:rPr>
+              <a:t> mi </a:t>
+            </a:r>
+            <a:r>
+              <a:rPr lang="en-IN" b="0" i="0" dirty="0" err="1">
+                <a:solidFill>
+                  <a:srgbClr val="000000"/>
+                </a:solidFill>
+                <a:effectLst/>
+                <a:latin typeface="Open Sans" panose="020F0502020204030204" pitchFamily="34" charset="0"/>
+              </a:rPr>
+              <a:t>luctus</a:t>
+            </a:r>
+            <a:r>
+              <a:rPr lang="en-IN" b="0" i="0" dirty="0">
+                <a:solidFill>
+                  <a:srgbClr val="000000"/>
+                </a:solidFill>
+                <a:effectLst/>
+                <a:latin typeface="Open Sans" panose="020F0502020204030204" pitchFamily="34" charset="0"/>
+              </a:rPr>
+              <a:t>. Morbi </a:t>
+            </a:r>
+            <a:r>
+              <a:rPr lang="en-IN" b="0" i="0" dirty="0" err="1">
+                <a:solidFill>
+                  <a:srgbClr val="000000"/>
+                </a:solidFill>
+                <a:effectLst/>
+                <a:latin typeface="Open Sans" panose="020F0502020204030204" pitchFamily="34" charset="0"/>
+              </a:rPr>
+              <a:t>mollis</a:t>
+            </a:r>
+            <a:r>
+              <a:rPr lang="en-IN" b="0" i="0" dirty="0">
+                <a:solidFill>
+                  <a:srgbClr val="000000"/>
+                </a:solidFill>
+                <a:effectLst/>
+                <a:latin typeface="Open Sans" panose="020F0502020204030204" pitchFamily="34" charset="0"/>
+              </a:rPr>
+              <a:t> </a:t>
+            </a:r>
+            <a:r>
+              <a:rPr lang="en-IN" b="0" i="0" dirty="0" err="1">
+                <a:solidFill>
+                  <a:srgbClr val="000000"/>
+                </a:solidFill>
+                <a:effectLst/>
+                <a:latin typeface="Open Sans" panose="020F0502020204030204" pitchFamily="34" charset="0"/>
+              </a:rPr>
+              <a:t>finibus</a:t>
+            </a:r>
+            <a:r>
+              <a:rPr lang="en-IN" b="0" i="0" dirty="0">
+                <a:solidFill>
+                  <a:srgbClr val="000000"/>
+                </a:solidFill>
+                <a:effectLst/>
+                <a:latin typeface="Open Sans" panose="020F0502020204030204" pitchFamily="34" charset="0"/>
+              </a:rPr>
+              <a:t> magna </a:t>
+            </a:r>
+            <a:r>
+              <a:rPr lang="en-IN" b="0" i="0" dirty="0" err="1">
+                <a:solidFill>
+                  <a:srgbClr val="000000"/>
+                </a:solidFill>
+                <a:effectLst/>
+                <a:latin typeface="Open Sans" panose="020F0502020204030204" pitchFamily="34" charset="0"/>
+              </a:rPr>
+              <a:t>vel</a:t>
+            </a:r>
+            <a:r>
+              <a:rPr lang="en-IN" b="0" i="0" dirty="0">
+                <a:solidFill>
+                  <a:srgbClr val="000000"/>
+                </a:solidFill>
+                <a:effectLst/>
+                <a:latin typeface="Open Sans" panose="020F0502020204030204" pitchFamily="34" charset="0"/>
+              </a:rPr>
+              <a:t> </a:t>
+            </a:r>
+            <a:r>
+              <a:rPr lang="en-IN" b="0" i="0" dirty="0" err="1">
+                <a:solidFill>
+                  <a:srgbClr val="000000"/>
+                </a:solidFill>
+                <a:effectLst/>
+                <a:latin typeface="Open Sans" panose="020F0502020204030204" pitchFamily="34" charset="0"/>
+              </a:rPr>
+              <a:t>ornare</a:t>
+            </a:r>
+            <a:r>
+              <a:rPr lang="en-IN" b="0" i="0" dirty="0">
+                <a:solidFill>
+                  <a:srgbClr val="000000"/>
+                </a:solidFill>
+                <a:effectLst/>
+                <a:latin typeface="Open Sans" panose="020F0502020204030204" pitchFamily="34" charset="0"/>
+              </a:rPr>
+              <a:t>. </a:t>
+            </a:r>
+            <a:r>
+              <a:rPr lang="en-IN" b="0" i="0" dirty="0" err="1">
+                <a:solidFill>
+                  <a:srgbClr val="000000"/>
+                </a:solidFill>
+                <a:effectLst/>
+                <a:latin typeface="Open Sans" panose="020F0502020204030204" pitchFamily="34" charset="0"/>
+              </a:rPr>
+              <a:t>Fusce</a:t>
+            </a:r>
+            <a:r>
+              <a:rPr lang="en-IN" b="0" i="0" dirty="0">
+                <a:solidFill>
+                  <a:srgbClr val="000000"/>
+                </a:solidFill>
+                <a:effectLst/>
+                <a:latin typeface="Open Sans" panose="020F0502020204030204" pitchFamily="34" charset="0"/>
+              </a:rPr>
+              <a:t> </a:t>
+            </a:r>
+            <a:r>
+              <a:rPr lang="en-IN" b="0" i="0" dirty="0" err="1">
+                <a:solidFill>
+                  <a:srgbClr val="000000"/>
+                </a:solidFill>
+                <a:effectLst/>
+                <a:latin typeface="Open Sans" panose="020F0502020204030204" pitchFamily="34" charset="0"/>
+              </a:rPr>
+              <a:t>condimentum</a:t>
+            </a:r>
+            <a:r>
+              <a:rPr lang="en-IN" b="0" i="0" dirty="0">
+                <a:solidFill>
+                  <a:srgbClr val="000000"/>
+                </a:solidFill>
+                <a:effectLst/>
+                <a:latin typeface="Open Sans" panose="020F0502020204030204" pitchFamily="34" charset="0"/>
+              </a:rPr>
+              <a:t> </a:t>
+            </a:r>
+            <a:r>
+              <a:rPr lang="en-IN" b="0" i="0" dirty="0" err="1">
+                <a:solidFill>
+                  <a:srgbClr val="000000"/>
+                </a:solidFill>
+                <a:effectLst/>
+                <a:latin typeface="Open Sans" panose="020F0502020204030204" pitchFamily="34" charset="0"/>
+              </a:rPr>
+              <a:t>est</a:t>
+            </a:r>
+            <a:r>
+              <a:rPr lang="en-IN" b="0" i="0" dirty="0">
+                <a:solidFill>
+                  <a:srgbClr val="000000"/>
+                </a:solidFill>
+                <a:effectLst/>
+                <a:latin typeface="Open Sans" panose="020F0502020204030204" pitchFamily="34" charset="0"/>
+              </a:rPr>
+              <a:t> </a:t>
+            </a:r>
+            <a:r>
+              <a:rPr lang="en-IN" b="0" i="0" dirty="0" err="1">
+                <a:solidFill>
+                  <a:srgbClr val="000000"/>
+                </a:solidFill>
+                <a:effectLst/>
+                <a:latin typeface="Open Sans" panose="020F0502020204030204" pitchFamily="34" charset="0"/>
+              </a:rPr>
+              <a:t>eu</a:t>
+            </a:r>
+            <a:r>
+              <a:rPr lang="en-IN" b="0" i="0" dirty="0">
+                <a:solidFill>
+                  <a:srgbClr val="000000"/>
+                </a:solidFill>
+                <a:effectLst/>
+                <a:latin typeface="Open Sans" panose="020F0502020204030204" pitchFamily="34" charset="0"/>
+              </a:rPr>
+              <a:t> </a:t>
+            </a:r>
+            <a:r>
+              <a:rPr lang="en-IN" b="0" i="0" dirty="0" err="1">
+                <a:solidFill>
+                  <a:srgbClr val="000000"/>
+                </a:solidFill>
+                <a:effectLst/>
+                <a:latin typeface="Open Sans" panose="020F0502020204030204" pitchFamily="34" charset="0"/>
+              </a:rPr>
+              <a:t>odio</a:t>
+            </a:r>
+            <a:r>
+              <a:rPr lang="en-IN" b="0" i="0" dirty="0">
+                <a:solidFill>
+                  <a:srgbClr val="000000"/>
+                </a:solidFill>
+                <a:effectLst/>
+                <a:latin typeface="Open Sans" panose="020F0502020204030204" pitchFamily="34" charset="0"/>
+              </a:rPr>
+              <a:t> tempus, et </a:t>
+            </a:r>
+            <a:r>
+              <a:rPr lang="en-IN" b="0" i="0" dirty="0" err="1">
+                <a:solidFill>
+                  <a:srgbClr val="000000"/>
+                </a:solidFill>
+                <a:effectLst/>
+                <a:latin typeface="Open Sans" panose="020F0502020204030204" pitchFamily="34" charset="0"/>
+              </a:rPr>
+              <a:t>malesuada</a:t>
+            </a:r>
+            <a:r>
+              <a:rPr lang="en-IN" b="0" i="0" dirty="0">
+                <a:solidFill>
+                  <a:srgbClr val="000000"/>
+                </a:solidFill>
+                <a:effectLst/>
+                <a:latin typeface="Open Sans" panose="020F0502020204030204" pitchFamily="34" charset="0"/>
+              </a:rPr>
+              <a:t> </a:t>
+            </a:r>
+            <a:r>
+              <a:rPr lang="en-IN" b="0" i="0" dirty="0" err="1">
+                <a:solidFill>
+                  <a:srgbClr val="000000"/>
+                </a:solidFill>
+                <a:effectLst/>
+                <a:latin typeface="Open Sans" panose="020F0502020204030204" pitchFamily="34" charset="0"/>
+              </a:rPr>
+              <a:t>nunc</a:t>
+            </a:r>
+            <a:r>
+              <a:rPr lang="en-IN" b="0" i="0" dirty="0">
+                <a:solidFill>
+                  <a:srgbClr val="000000"/>
+                </a:solidFill>
+                <a:effectLst/>
+                <a:latin typeface="Open Sans" panose="020F0502020204030204" pitchFamily="34" charset="0"/>
+              </a:rPr>
+              <a:t> porta. </a:t>
+            </a:r>
+            <a:r>
+              <a:rPr lang="en-IN" b="0" i="0" dirty="0" err="1">
+                <a:solidFill>
+                  <a:srgbClr val="000000"/>
+                </a:solidFill>
+                <a:effectLst/>
+                <a:latin typeface="Open Sans" panose="020F0502020204030204" pitchFamily="34" charset="0"/>
+              </a:rPr>
+              <a:t>Pellentesque</a:t>
+            </a:r>
+            <a:r>
+              <a:rPr lang="en-IN" b="0" i="0" dirty="0">
+                <a:solidFill>
+                  <a:srgbClr val="000000"/>
+                </a:solidFill>
+                <a:effectLst/>
+                <a:latin typeface="Open Sans" panose="020F0502020204030204" pitchFamily="34" charset="0"/>
+              </a:rPr>
+              <a:t> </a:t>
+            </a:r>
+            <a:r>
+              <a:rPr lang="en-IN" b="0" i="0" dirty="0" err="1">
+                <a:solidFill>
+                  <a:srgbClr val="000000"/>
+                </a:solidFill>
+                <a:effectLst/>
+                <a:latin typeface="Open Sans" panose="020F0502020204030204" pitchFamily="34" charset="0"/>
+              </a:rPr>
+              <a:t>placerat</a:t>
+            </a:r>
+            <a:r>
+              <a:rPr lang="en-IN" b="0" i="0" dirty="0">
+                <a:solidFill>
+                  <a:srgbClr val="000000"/>
+                </a:solidFill>
+                <a:effectLst/>
+                <a:latin typeface="Open Sans" panose="020F0502020204030204" pitchFamily="34" charset="0"/>
+              </a:rPr>
+              <a:t> </a:t>
+            </a:r>
+            <a:r>
+              <a:rPr lang="en-IN" b="0" i="0" dirty="0" err="1">
+                <a:solidFill>
+                  <a:srgbClr val="000000"/>
+                </a:solidFill>
+                <a:effectLst/>
+                <a:latin typeface="Open Sans" panose="020F0502020204030204" pitchFamily="34" charset="0"/>
+              </a:rPr>
+              <a:t>bibendum</a:t>
+            </a:r>
+            <a:r>
+              <a:rPr lang="en-IN" b="0" i="0" dirty="0">
+                <a:solidFill>
+                  <a:srgbClr val="000000"/>
+                </a:solidFill>
+                <a:effectLst/>
+                <a:latin typeface="Open Sans" panose="020F0502020204030204" pitchFamily="34" charset="0"/>
+              </a:rPr>
+              <a:t> </a:t>
+            </a:r>
+            <a:r>
+              <a:rPr lang="en-IN" b="0" i="0" dirty="0" err="1">
+                <a:solidFill>
+                  <a:srgbClr val="000000"/>
+                </a:solidFill>
+                <a:effectLst/>
+                <a:latin typeface="Open Sans" panose="020F0502020204030204" pitchFamily="34" charset="0"/>
+              </a:rPr>
+              <a:t>lacus</a:t>
+            </a:r>
+            <a:r>
+              <a:rPr lang="en-IN" b="0" i="0" dirty="0">
+                <a:solidFill>
+                  <a:srgbClr val="000000"/>
+                </a:solidFill>
+                <a:effectLst/>
+                <a:latin typeface="Open Sans" panose="020F0502020204030204" pitchFamily="34" charset="0"/>
+              </a:rPr>
+              <a:t> sit </a:t>
+            </a:r>
+            <a:r>
+              <a:rPr lang="en-IN" b="0" i="0" dirty="0" err="1">
+                <a:solidFill>
+                  <a:srgbClr val="000000"/>
+                </a:solidFill>
+                <a:effectLst/>
+                <a:latin typeface="Open Sans" panose="020F0502020204030204" pitchFamily="34" charset="0"/>
+              </a:rPr>
+              <a:t>amet</a:t>
+            </a:r>
+            <a:r>
+              <a:rPr lang="en-IN" b="0" i="0" dirty="0">
+                <a:solidFill>
+                  <a:srgbClr val="000000"/>
+                </a:solidFill>
+                <a:effectLst/>
+                <a:latin typeface="Open Sans" panose="020F0502020204030204" pitchFamily="34" charset="0"/>
+              </a:rPr>
+              <a:t> </a:t>
+            </a:r>
+            <a:r>
+              <a:rPr lang="en-IN" b="0" i="0" dirty="0" err="1">
+                <a:solidFill>
+                  <a:srgbClr val="000000"/>
+                </a:solidFill>
+                <a:effectLst/>
+                <a:latin typeface="Open Sans" panose="020F0502020204030204" pitchFamily="34" charset="0"/>
+              </a:rPr>
+              <a:t>tincidunt</a:t>
+            </a:r>
+            <a:r>
+              <a:rPr lang="en-IN" b="0" i="0" dirty="0">
+                <a:solidFill>
+                  <a:srgbClr val="000000"/>
+                </a:solidFill>
+                <a:effectLst/>
+                <a:latin typeface="Open Sans" panose="020F0502020204030204" pitchFamily="34" charset="0"/>
+              </a:rPr>
+              <a:t>. Morbi </a:t>
+            </a:r>
+            <a:r>
+              <a:rPr lang="en-IN" b="0" i="0" dirty="0" err="1">
+                <a:solidFill>
+                  <a:srgbClr val="000000"/>
+                </a:solidFill>
+                <a:effectLst/>
+                <a:latin typeface="Open Sans" panose="020F0502020204030204" pitchFamily="34" charset="0"/>
+              </a:rPr>
+              <a:t>interdum</a:t>
+            </a:r>
+            <a:r>
+              <a:rPr lang="en-IN" b="0" i="0" dirty="0">
+                <a:solidFill>
+                  <a:srgbClr val="000000"/>
+                </a:solidFill>
+                <a:effectLst/>
+                <a:latin typeface="Open Sans" panose="020F0502020204030204" pitchFamily="34" charset="0"/>
+              </a:rPr>
+              <a:t> </a:t>
+            </a:r>
+            <a:r>
+              <a:rPr lang="en-IN" b="0" i="0" dirty="0" err="1">
+                <a:solidFill>
+                  <a:srgbClr val="000000"/>
+                </a:solidFill>
+                <a:effectLst/>
+                <a:latin typeface="Open Sans" panose="020F0502020204030204" pitchFamily="34" charset="0"/>
+              </a:rPr>
+              <a:t>mauris</a:t>
+            </a:r>
+            <a:r>
+              <a:rPr lang="en-IN" b="0" i="0" dirty="0">
+                <a:solidFill>
+                  <a:srgbClr val="000000"/>
+                </a:solidFill>
+                <a:effectLst/>
+                <a:latin typeface="Open Sans" panose="020F0502020204030204" pitchFamily="34" charset="0"/>
+              </a:rPr>
+              <a:t> </a:t>
+            </a:r>
+            <a:r>
+              <a:rPr lang="en-IN" b="0" i="0" dirty="0" err="1">
+                <a:solidFill>
+                  <a:srgbClr val="000000"/>
+                </a:solidFill>
+                <a:effectLst/>
+                <a:latin typeface="Open Sans" panose="020F0502020204030204" pitchFamily="34" charset="0"/>
+              </a:rPr>
+              <a:t>quis</a:t>
+            </a:r>
+            <a:r>
+              <a:rPr lang="en-IN" b="0" i="0" dirty="0">
+                <a:solidFill>
+                  <a:srgbClr val="000000"/>
+                </a:solidFill>
+                <a:effectLst/>
+                <a:latin typeface="Open Sans" panose="020F0502020204030204" pitchFamily="34" charset="0"/>
+              </a:rPr>
+              <a:t> mi lacinia, </a:t>
+            </a:r>
+            <a:r>
+              <a:rPr lang="en-IN" b="0" i="0" dirty="0" err="1">
+                <a:solidFill>
+                  <a:srgbClr val="000000"/>
+                </a:solidFill>
+                <a:effectLst/>
+                <a:latin typeface="Open Sans" panose="020F0502020204030204" pitchFamily="34" charset="0"/>
+              </a:rPr>
+              <a:t>ut</a:t>
+            </a:r>
+            <a:r>
+              <a:rPr lang="en-IN" b="0" i="0" dirty="0">
+                <a:solidFill>
+                  <a:srgbClr val="000000"/>
+                </a:solidFill>
+                <a:effectLst/>
+                <a:latin typeface="Open Sans" panose="020F0502020204030204" pitchFamily="34" charset="0"/>
+              </a:rPr>
+              <a:t> porta </a:t>
+            </a:r>
+            <a:r>
+              <a:rPr lang="en-IN" b="0" i="0" dirty="0" err="1">
+                <a:solidFill>
+                  <a:srgbClr val="000000"/>
+                </a:solidFill>
+                <a:effectLst/>
+                <a:latin typeface="Open Sans" panose="020F0502020204030204" pitchFamily="34" charset="0"/>
+              </a:rPr>
+              <a:t>velit</a:t>
+            </a:r>
+            <a:r>
+              <a:rPr lang="en-IN" b="0" i="0" dirty="0">
+                <a:solidFill>
+                  <a:srgbClr val="000000"/>
+                </a:solidFill>
+                <a:effectLst/>
+                <a:latin typeface="Open Sans" panose="020F0502020204030204" pitchFamily="34" charset="0"/>
+              </a:rPr>
+              <a:t> </a:t>
+            </a:r>
+            <a:r>
+              <a:rPr lang="en-IN" b="0" i="0" dirty="0" err="1">
+                <a:solidFill>
+                  <a:srgbClr val="000000"/>
+                </a:solidFill>
+                <a:effectLst/>
+                <a:latin typeface="Open Sans" panose="020F0502020204030204" pitchFamily="34" charset="0"/>
+              </a:rPr>
+              <a:t>venenatis</a:t>
+            </a:r>
+            <a:r>
+              <a:rPr lang="en-IN" b="0" i="0" dirty="0">
+                <a:solidFill>
+                  <a:srgbClr val="000000"/>
+                </a:solidFill>
+                <a:effectLst/>
+                <a:latin typeface="Open Sans" panose="020F0502020204030204" pitchFamily="34" charset="0"/>
+              </a:rPr>
+              <a:t>. </a:t>
+            </a:r>
+            <a:r>
+              <a:rPr lang="en-IN" b="0" i="0" dirty="0" err="1">
+                <a:solidFill>
+                  <a:srgbClr val="000000"/>
+                </a:solidFill>
+                <a:effectLst/>
+                <a:latin typeface="Open Sans" panose="020F0502020204030204" pitchFamily="34" charset="0"/>
+              </a:rPr>
+              <a:t>Etiam</a:t>
+            </a:r>
+            <a:r>
+              <a:rPr lang="en-IN" b="0" i="0" dirty="0">
+                <a:solidFill>
+                  <a:srgbClr val="000000"/>
+                </a:solidFill>
+                <a:effectLst/>
+                <a:latin typeface="Open Sans" panose="020F0502020204030204" pitchFamily="34" charset="0"/>
+              </a:rPr>
+              <a:t> </a:t>
+            </a:r>
+            <a:r>
+              <a:rPr lang="en-IN" b="0" i="0" dirty="0" err="1">
+                <a:solidFill>
+                  <a:srgbClr val="000000"/>
+                </a:solidFill>
+                <a:effectLst/>
+                <a:latin typeface="Open Sans" panose="020F0502020204030204" pitchFamily="34" charset="0"/>
+              </a:rPr>
+              <a:t>sagittis</a:t>
+            </a:r>
+            <a:r>
+              <a:rPr lang="en-IN" b="0" i="0" dirty="0">
+                <a:solidFill>
+                  <a:srgbClr val="000000"/>
+                </a:solidFill>
+                <a:effectLst/>
+                <a:latin typeface="Open Sans" panose="020F0502020204030204" pitchFamily="34" charset="0"/>
+              </a:rPr>
+              <a:t> </a:t>
+            </a:r>
+            <a:r>
+              <a:rPr lang="en-IN" b="0" i="0" dirty="0" err="1">
+                <a:solidFill>
+                  <a:srgbClr val="000000"/>
+                </a:solidFill>
+                <a:effectLst/>
+                <a:latin typeface="Open Sans" panose="020F0502020204030204" pitchFamily="34" charset="0"/>
+              </a:rPr>
+              <a:t>efficitur</a:t>
+            </a:r>
+            <a:r>
+              <a:rPr lang="en-IN" b="0" i="0" dirty="0">
+                <a:solidFill>
+                  <a:srgbClr val="000000"/>
+                </a:solidFill>
+                <a:effectLst/>
+                <a:latin typeface="Open Sans" panose="020F0502020204030204" pitchFamily="34" charset="0"/>
+              </a:rPr>
+              <a:t> </a:t>
+            </a:r>
+            <a:r>
+              <a:rPr lang="en-IN" b="0" i="0" dirty="0" err="1">
+                <a:solidFill>
+                  <a:srgbClr val="000000"/>
+                </a:solidFill>
+                <a:effectLst/>
+                <a:latin typeface="Open Sans" panose="020F0502020204030204" pitchFamily="34" charset="0"/>
+              </a:rPr>
+              <a:t>tincidunt</a:t>
+            </a:r>
+            <a:r>
+              <a:rPr lang="en-IN" b="0" i="0" dirty="0">
+                <a:solidFill>
+                  <a:srgbClr val="000000"/>
+                </a:solidFill>
+                <a:effectLst/>
+                <a:latin typeface="Open Sans" panose="020F0502020204030204" pitchFamily="34" charset="0"/>
+              </a:rPr>
+              <a:t>. </a:t>
+            </a:r>
+            <a:r>
+              <a:rPr lang="en-IN" b="0" i="0" dirty="0" err="1">
+                <a:solidFill>
+                  <a:srgbClr val="000000"/>
+                </a:solidFill>
+                <a:effectLst/>
+                <a:latin typeface="Open Sans" panose="020F0502020204030204" pitchFamily="34" charset="0"/>
+              </a:rPr>
+              <a:t>Suspendisse</a:t>
+            </a:r>
+            <a:r>
+              <a:rPr lang="en-IN" b="0" i="0" dirty="0">
+                <a:solidFill>
+                  <a:srgbClr val="000000"/>
+                </a:solidFill>
+                <a:effectLst/>
+                <a:latin typeface="Open Sans" panose="020F0502020204030204" pitchFamily="34" charset="0"/>
+              </a:rPr>
+              <a:t> </a:t>
+            </a:r>
+            <a:r>
+              <a:rPr lang="en-IN" b="0" i="0" dirty="0" err="1">
+                <a:solidFill>
+                  <a:srgbClr val="000000"/>
+                </a:solidFill>
+                <a:effectLst/>
+                <a:latin typeface="Open Sans" panose="020F0502020204030204" pitchFamily="34" charset="0"/>
+              </a:rPr>
+              <a:t>tristique</a:t>
+            </a:r>
+            <a:r>
+              <a:rPr lang="en-IN" b="0" i="0" dirty="0">
+                <a:solidFill>
+                  <a:srgbClr val="000000"/>
+                </a:solidFill>
+                <a:effectLst/>
+                <a:latin typeface="Open Sans" panose="020F0502020204030204" pitchFamily="34" charset="0"/>
+              </a:rPr>
+              <a:t> </a:t>
+            </a:r>
+            <a:r>
+              <a:rPr lang="en-IN" b="0" i="0" dirty="0" err="1">
+                <a:solidFill>
+                  <a:srgbClr val="000000"/>
+                </a:solidFill>
+                <a:effectLst/>
+                <a:latin typeface="Open Sans" panose="020F0502020204030204" pitchFamily="34" charset="0"/>
+              </a:rPr>
+              <a:t>quis</a:t>
+            </a:r>
+            <a:r>
+              <a:rPr lang="en-IN" b="0" i="0" dirty="0">
+                <a:solidFill>
+                  <a:srgbClr val="000000"/>
+                </a:solidFill>
+                <a:effectLst/>
+                <a:latin typeface="Open Sans" panose="020F0502020204030204" pitchFamily="34" charset="0"/>
+              </a:rPr>
+              <a:t> magna </a:t>
+            </a:r>
+            <a:r>
+              <a:rPr lang="en-IN" b="0" i="0" dirty="0" err="1">
+                <a:solidFill>
+                  <a:srgbClr val="000000"/>
+                </a:solidFill>
+                <a:effectLst/>
+                <a:latin typeface="Open Sans" panose="020F0502020204030204" pitchFamily="34" charset="0"/>
+              </a:rPr>
+              <a:t>ullamcorper</a:t>
+            </a:r>
+            <a:r>
+              <a:rPr lang="en-IN" b="0" i="0" dirty="0">
+                <a:solidFill>
+                  <a:srgbClr val="000000"/>
+                </a:solidFill>
+                <a:effectLst/>
+                <a:latin typeface="Open Sans" panose="020F0502020204030204" pitchFamily="34" charset="0"/>
+              </a:rPr>
+              <a:t> </a:t>
+            </a:r>
+            <a:r>
+              <a:rPr lang="en-IN" b="0" i="0" dirty="0" err="1">
+                <a:solidFill>
+                  <a:srgbClr val="000000"/>
+                </a:solidFill>
+                <a:effectLst/>
+                <a:latin typeface="Open Sans" panose="020F0502020204030204" pitchFamily="34" charset="0"/>
+              </a:rPr>
+              <a:t>euismod</a:t>
+            </a:r>
+            <a:r>
+              <a:rPr lang="en-IN" b="0" i="0" dirty="0">
+                <a:solidFill>
+                  <a:srgbClr val="000000"/>
+                </a:solidFill>
+                <a:effectLst/>
+                <a:latin typeface="Open Sans" panose="020F0502020204030204" pitchFamily="34" charset="0"/>
+              </a:rPr>
+              <a:t>.</a:t>
+            </a:r>
+          </a:p>
+          <a:p>
+            <a:pPr>
+              <a:buNone/>
+            </a:pPr>
+            <a:r>
+              <a:rPr lang="en-IN" dirty="0"/>
+              <a:t>	</a:t>
+            </a:r>
+            <a:endParaRPr lang="en-US" dirty="0"/>
+          </a:p>
+          <a:p>
+            <a:r>
+              <a:rPr lang="en-US" dirty="0"/>
+              <a:t>Disclaimer: I do not have new results to show since I spent most of the last one month troubleshooting, I am still stuck on the same grey heatmap that I’d presented the last time. But I would like any inputs that any of you can share, or any new loopholes that you can identify in the workflow.</a:t>
+            </a:r>
+            <a:endParaRPr lang="en-IN" dirty="0"/>
+          </a:p>
+        </p:txBody>
+      </p:sp>
+      <p:sp>
+        <p:nvSpPr>
+          <p:cNvPr id="4" name="Slide Number Placeholder 3">
+            <a:extLst>
+              <a:ext uri="{FF2B5EF4-FFF2-40B4-BE49-F238E27FC236}">
+                <a16:creationId xmlns:a16="http://schemas.microsoft.com/office/drawing/2014/main" id="{160E8611-AA6A-35A9-C212-42862E6EA340}"/>
+              </a:ext>
+            </a:extLst>
+          </p:cNvPr>
           <p:cNvSpPr>
             <a:spLocks noGrp="1"/>
           </p:cNvSpPr>
@@ -541,7 +2143,7 @@
     </p:spTree>
     <p:extLst>
       <p:ext uri="{BB962C8B-B14F-4D97-AF65-F5344CB8AC3E}">
-        <p14:creationId xmlns:p14="http://schemas.microsoft.com/office/powerpoint/2010/main" val="3459284806"/>
+        <p14:creationId xmlns:p14="http://schemas.microsoft.com/office/powerpoint/2010/main" val="1396741208"/>
       </p:ext>
     </p:extLst>
   </p:cSld>
@@ -659,7 +2261,69 @@
               <a:buFont typeface="Arial"/>
               <a:buNone/>
             </a:pPr>
-            <a:endParaRPr sz="1100">
+            <a:r>
+              <a:rPr lang="en-US" sz="1100" dirty="0">
+                <a:solidFill>
+                  <a:schemeClr val="dk1"/>
+                </a:solidFill>
+              </a:rPr>
+              <a:t>A quick recap of what we were doing whilst studying mitogenomes, and specifically signals behind translocations: we were interested in looking at a potential ‘molecular signal’ (I will explain what that means at the end) that, some mysterious unknown machinery, that is supposedly imported from the nucleus into the mitochondria, recognizes when chopping up the genome and carrying out translocations. </a:t>
+            </a:r>
+          </a:p>
+          <a:p>
+            <a:pPr marL="0" lvl="0" indent="0" algn="l" rtl="0">
+              <a:lnSpc>
+                <a:spcPct val="115000"/>
+              </a:lnSpc>
+              <a:spcBef>
+                <a:spcPts val="1200"/>
+              </a:spcBef>
+              <a:spcAft>
+                <a:spcPts val="1200"/>
+              </a:spcAft>
+              <a:buClr>
+                <a:schemeClr val="dk1"/>
+              </a:buClr>
+              <a:buSzPts val="1100"/>
+              <a:buFont typeface="Arial"/>
+              <a:buNone/>
+            </a:pPr>
+            <a:r>
+              <a:rPr lang="en-US" sz="1100" dirty="0">
+                <a:solidFill>
+                  <a:schemeClr val="dk1"/>
+                </a:solidFill>
+              </a:rPr>
+              <a:t>Translocations can take place between the mitogenome and the nucleus, which was why this was of some interest, but for whatever I’ve been doing so far, I’ve only been considering intra-mitogenome translocations, and not genomic sequence translocations across membranes.</a:t>
+            </a:r>
+          </a:p>
+          <a:p>
+            <a:pPr marL="0" lvl="0" indent="0" algn="l" rtl="0">
+              <a:lnSpc>
+                <a:spcPct val="115000"/>
+              </a:lnSpc>
+              <a:spcBef>
+                <a:spcPts val="1200"/>
+              </a:spcBef>
+              <a:spcAft>
+                <a:spcPts val="1200"/>
+              </a:spcAft>
+              <a:buClr>
+                <a:schemeClr val="dk1"/>
+              </a:buClr>
+              <a:buSzPts val="1100"/>
+              <a:buFont typeface="Arial"/>
+              <a:buNone/>
+            </a:pPr>
+            <a:r>
+              <a:rPr lang="en-US" sz="1100" dirty="0">
+                <a:solidFill>
+                  <a:schemeClr val="dk1"/>
+                </a:solidFill>
+              </a:rPr>
+              <a:t>I’d explained the why behind this the last time, but the dataset I am using is a number of ANIMAL mitochondrial genomes, about 55 as of now until I can refine this entire workflow and try it on a larger dataset. I’ve listed the two big reasons there. Turns out that those two same reasons are exactly what cause all the problems I’ve faced over the last few weeks, and I will go over those in the next few slides.</a:t>
+            </a:r>
+            <a:endParaRPr sz="1100" dirty="0">
               <a:solidFill>
                 <a:schemeClr val="dk1"/>
               </a:solidFill>
@@ -801,11 +2465,219 @@
               <a:buFont typeface="Arial"/>
               <a:buNone/>
             </a:pPr>
-            <a:endParaRPr sz="1100">
-              <a:solidFill>
+            <a:r>
+              <a:rPr lang="en-US" sz="1100" dirty="0">
+                <a:solidFill>
+                  <a:schemeClr val="dk1"/>
+                </a:solidFill>
+              </a:rPr>
+              <a:t>This is the workflow itself: the goal is to identify specific ‘sites’ where translocations have taken place across the evolution of the mitogenome. However, since the nucleotide sequences themselves don’t provide any clue about where a translocation has happened, the only sure-fire indicator of sequences having been translocated, is the location and order of the genes themselves, which have already been annotated in the genome files on the NCBI database. </a:t>
+            </a:r>
+          </a:p>
+          <a:p>
+            <a:pPr marL="0" lvl="0" indent="0" algn="l" rtl="0">
+              <a:lnSpc>
+                <a:spcPct val="115000"/>
+              </a:lnSpc>
+              <a:spcBef>
+                <a:spcPts val="1200"/>
+              </a:spcBef>
+              <a:spcAft>
+                <a:spcPts val="1200"/>
+              </a:spcAft>
+              <a:buClr>
                 <a:schemeClr val="dk1"/>
-              </a:solidFill>
-            </a:endParaRPr>
+              </a:buClr>
+              <a:buSzPts val="1100"/>
+              <a:buFont typeface="Arial"/>
+              <a:buNone/>
+            </a:pPr>
+            <a:r>
+              <a:rPr lang="en-US" sz="1100" dirty="0">
+                <a:solidFill>
+                  <a:schemeClr val="dk1"/>
+                </a:solidFill>
+              </a:rPr>
+              <a:t>So, I start with a dataset of a number of mitogenomes, and I wish to arrange them in some ‘evolutionary order’, which is supposed to reflect how translocation events have happened across their evolution. In order to do this I come up with some custom-DISTANCE METRIC (I will elaborate on that in the next slide), which is supposed to represent how ‘different’ two gene-orders are from each other (when I say gene order I mean an ordered list of genes of that genome, starting from the TSS).</a:t>
+            </a:r>
+          </a:p>
+          <a:p>
+            <a:pPr marL="0" lvl="0" indent="0" algn="l" rtl="0">
+              <a:lnSpc>
+                <a:spcPct val="115000"/>
+              </a:lnSpc>
+              <a:spcBef>
+                <a:spcPts val="1200"/>
+              </a:spcBef>
+              <a:spcAft>
+                <a:spcPts val="1200"/>
+              </a:spcAft>
+              <a:buClr>
+                <a:schemeClr val="dk1"/>
+              </a:buClr>
+              <a:buSzPts val="1100"/>
+              <a:buFont typeface="Arial"/>
+              <a:buNone/>
+            </a:pPr>
+            <a:r>
+              <a:rPr lang="en-US" sz="1100" dirty="0">
+                <a:solidFill>
+                  <a:schemeClr val="dk1"/>
+                </a:solidFill>
+              </a:rPr>
+              <a:t>Using this distance metric I can construct a distance matrix for genomes taken pairwise, construct phylogeny based on this matrix, and then arrange the leaves of that tree into an ordered list that I can further use. </a:t>
+            </a:r>
+          </a:p>
+          <a:p>
+            <a:pPr marL="0" lvl="0" indent="0" algn="l" rtl="0">
+              <a:lnSpc>
+                <a:spcPct val="115000"/>
+              </a:lnSpc>
+              <a:spcBef>
+                <a:spcPts val="1200"/>
+              </a:spcBef>
+              <a:spcAft>
+                <a:spcPts val="1200"/>
+              </a:spcAft>
+              <a:buClr>
+                <a:schemeClr val="dk1"/>
+              </a:buClr>
+              <a:buSzPts val="1100"/>
+              <a:buFont typeface="Arial"/>
+              <a:buNone/>
+            </a:pPr>
+            <a:r>
+              <a:rPr lang="en-US" sz="1100" dirty="0">
+                <a:solidFill>
+                  <a:schemeClr val="dk1"/>
+                </a:solidFill>
+              </a:rPr>
+              <a:t>Why am I using the gene orders as my metric? Mainly because I don’t have a better way of aligning a large number of these genomes which are each ~15k base pairs in one go.</a:t>
+            </a:r>
+          </a:p>
+          <a:p>
+            <a:pPr marL="0" lvl="0" indent="0" algn="l" rtl="0">
+              <a:lnSpc>
+                <a:spcPct val="115000"/>
+              </a:lnSpc>
+              <a:spcBef>
+                <a:spcPts val="1200"/>
+              </a:spcBef>
+              <a:spcAft>
+                <a:spcPts val="1200"/>
+              </a:spcAft>
+              <a:buClr>
+                <a:schemeClr val="dk1"/>
+              </a:buClr>
+              <a:buSzPts val="1100"/>
+              <a:buFont typeface="Arial"/>
+              <a:buNone/>
+            </a:pPr>
+            <a:r>
+              <a:rPr lang="en-US" sz="1100" dirty="0">
+                <a:solidFill>
+                  <a:schemeClr val="dk1"/>
+                </a:solidFill>
+              </a:rPr>
+              <a:t>Now that I have my ordered list, I identify synteny blocks between two genomes in that list, which are defined as conserved blocks of DNA which have not been chopped up. In my case, I treat ‘gene chunks’, as the synteny blocks. Between these pairwise genomes, once I have identified these synteny blocks, I identify the breakpoints, which is where the chopping up has taken place. And those are the locations we are interested in. </a:t>
+            </a:r>
+          </a:p>
+          <a:p>
+            <a:pPr marL="0" lvl="0" indent="0" algn="l" rtl="0">
+              <a:lnSpc>
+                <a:spcPct val="115000"/>
+              </a:lnSpc>
+              <a:spcBef>
+                <a:spcPts val="1200"/>
+              </a:spcBef>
+              <a:spcAft>
+                <a:spcPts val="1200"/>
+              </a:spcAft>
+              <a:buClr>
+                <a:schemeClr val="dk1"/>
+              </a:buClr>
+              <a:buSzPts val="1100"/>
+              <a:buFont typeface="Arial"/>
+              <a:buNone/>
+            </a:pPr>
+            <a:r>
+              <a:rPr lang="en-US" sz="1100" dirty="0">
+                <a:solidFill>
+                  <a:schemeClr val="dk1"/>
+                </a:solidFill>
+              </a:rPr>
+              <a:t>Quick note: the whole point of taking up the animal mitochondrial genomes was because they had minimal non-coding region content, and all of their genes were adjacent to each other, which meant that the regions in between genes was at max a few base pairs, and that is likely where our ‘signal’ is. </a:t>
+            </a:r>
+          </a:p>
+          <a:p>
+            <a:pPr marL="0" lvl="0" indent="0" algn="l" rtl="0">
+              <a:lnSpc>
+                <a:spcPct val="115000"/>
+              </a:lnSpc>
+              <a:spcBef>
+                <a:spcPts val="1200"/>
+              </a:spcBef>
+              <a:spcAft>
+                <a:spcPts val="1200"/>
+              </a:spcAft>
+              <a:buClr>
+                <a:schemeClr val="dk1"/>
+              </a:buClr>
+              <a:buSzPts val="1100"/>
+              <a:buFont typeface="Arial"/>
+              <a:buNone/>
+            </a:pPr>
+            <a:r>
+              <a:rPr lang="en-US" sz="1100" dirty="0">
+                <a:solidFill>
+                  <a:schemeClr val="dk1"/>
+                </a:solidFill>
+              </a:rPr>
+              <a:t>Using the information I have about the gene orders, I take some length of nucleotides around that region of interest, and store those sequences. I do this for all identified breakpoints between two genomes, and likewise all genomes taken pairwise in my ordered list.</a:t>
+            </a:r>
+          </a:p>
+          <a:p>
+            <a:pPr marL="0" lvl="0" indent="0" algn="l" rtl="0">
+              <a:lnSpc>
+                <a:spcPct val="115000"/>
+              </a:lnSpc>
+              <a:spcBef>
+                <a:spcPts val="1200"/>
+              </a:spcBef>
+              <a:spcAft>
+                <a:spcPts val="1200"/>
+              </a:spcAft>
+              <a:buClr>
+                <a:schemeClr val="dk1"/>
+              </a:buClr>
+              <a:buSzPts val="1100"/>
+              <a:buFont typeface="Arial"/>
+              <a:buNone/>
+            </a:pPr>
+            <a:r>
+              <a:rPr lang="en-US" sz="1100" dirty="0">
+                <a:solidFill>
+                  <a:schemeClr val="dk1"/>
+                </a:solidFill>
+              </a:rPr>
+              <a:t>This will form my dataset of sequences that I need to </a:t>
+            </a:r>
+            <a:r>
+              <a:rPr lang="en-US" sz="1100" dirty="0" err="1">
+                <a:solidFill>
+                  <a:schemeClr val="dk1"/>
+                </a:solidFill>
+              </a:rPr>
+              <a:t>analyse</a:t>
+            </a:r>
+            <a:r>
+              <a:rPr lang="en-US" sz="1100" dirty="0">
+                <a:solidFill>
+                  <a:schemeClr val="dk1"/>
+                </a:solidFill>
+              </a:rPr>
+              <a:t>. </a:t>
+            </a:r>
           </a:p>
         </p:txBody>
       </p:sp>
@@ -948,7 +2820,15 @@
               <a:buFont typeface="Arial"/>
               <a:buNone/>
             </a:pPr>
-            <a:endParaRPr sz="1100">
+            <a:r>
+              <a:rPr lang="en-US" sz="1100" dirty="0">
+                <a:solidFill>
+                  <a:schemeClr val="dk1"/>
+                </a:solidFill>
+              </a:rPr>
+              <a:t>I’d shown this plot the last time as well. This was the 700-odd set of sequences that I had obtained from the workflow (albeit I had to do a lot of troubleshooting afterwards), for which I had constructed 5-mer motif vectors and performed a correlation between each of them taken pairwise. Other than the diagonal of 100% correlations, and some random off-diagonal streaks, most of the sequences have zero correlation. Most of what I’ve been trying to do since then has been to troubleshoot this and see what would give a potentially high correlation value to at least some significant fraction of this dataset. I will go over some of these in the next few slides.</a:t>
+            </a:r>
+            <a:endParaRPr sz="1100" dirty="0">
               <a:solidFill>
                 <a:schemeClr val="dk1"/>
               </a:solidFill>
@@ -1095,7 +2975,98 @@
               <a:buFont typeface="Arial"/>
               <a:buNone/>
             </a:pPr>
-            <a:endParaRPr sz="1100">
+            <a:r>
+              <a:rPr lang="en-US" sz="1100" dirty="0">
+                <a:solidFill>
+                  <a:schemeClr val="dk1"/>
+                </a:solidFill>
+              </a:rPr>
+              <a:t>First was the distance metric itself. I had proposed something called a ‘</a:t>
+            </a:r>
+            <a:r>
+              <a:rPr lang="en-US" sz="1100" dirty="0" err="1">
+                <a:solidFill>
+                  <a:schemeClr val="dk1"/>
+                </a:solidFill>
+              </a:rPr>
+              <a:t>Damerau-Levenshtein</a:t>
+            </a:r>
+            <a:r>
+              <a:rPr lang="en-US" sz="1100" dirty="0">
+                <a:solidFill>
+                  <a:schemeClr val="dk1"/>
+                </a:solidFill>
+              </a:rPr>
+              <a:t> edit distance’, which is an idea borrowed from computer scientists. It is essentially a more general version of the standard alignment algorithms we know of, but for an ordered list of many characters (or in this case, genes). I did try making modified versions of this metric, for example by assigning a </a:t>
+            </a:r>
+            <a:r>
+              <a:rPr lang="en-US" sz="1100" dirty="0" err="1">
+                <a:solidFill>
+                  <a:schemeClr val="dk1"/>
+                </a:solidFill>
+              </a:rPr>
+              <a:t>Levenshtein</a:t>
+            </a:r>
+            <a:r>
+              <a:rPr lang="en-US" sz="1100" dirty="0">
+                <a:solidFill>
+                  <a:schemeClr val="dk1"/>
+                </a:solidFill>
+              </a:rPr>
+              <a:t> distance score for the CDS genes and the RNA genes separately, and then assigning a score that I some linear combination of them both. But I did find that although closely-related organisms were clustered together, the clusters themselves weren’t arranged in a biologically sensible order. The issue again is that the number of genes is too small for the metric to separate far-away genomes well enough. </a:t>
+            </a:r>
+          </a:p>
+          <a:p>
+            <a:pPr marL="0" lvl="0" indent="0" algn="l" rtl="0">
+              <a:lnSpc>
+                <a:spcPct val="115000"/>
+              </a:lnSpc>
+              <a:spcBef>
+                <a:spcPts val="1200"/>
+              </a:spcBef>
+              <a:spcAft>
+                <a:spcPts val="1200"/>
+              </a:spcAft>
+              <a:buClr>
+                <a:schemeClr val="dk1"/>
+              </a:buClr>
+              <a:buSzPts val="1100"/>
+              <a:buFont typeface="Arial"/>
+              <a:buNone/>
+            </a:pPr>
+            <a:endParaRPr lang="en-US" sz="1100" dirty="0">
+              <a:solidFill>
+                <a:schemeClr val="dk1"/>
+              </a:solidFill>
+            </a:endParaRPr>
+          </a:p>
+          <a:p>
+            <a:pPr marL="0" lvl="0" indent="0" algn="l" rtl="0">
+              <a:lnSpc>
+                <a:spcPct val="115000"/>
+              </a:lnSpc>
+              <a:spcBef>
+                <a:spcPts val="1200"/>
+              </a:spcBef>
+              <a:spcAft>
+                <a:spcPts val="1200"/>
+              </a:spcAft>
+              <a:buClr>
+                <a:schemeClr val="dk1"/>
+              </a:buClr>
+              <a:buSzPts val="1100"/>
+              <a:buFont typeface="Arial"/>
+              <a:buNone/>
+            </a:pPr>
+            <a:r>
+              <a:rPr lang="en-US" sz="1100" dirty="0">
+                <a:solidFill>
+                  <a:schemeClr val="dk1"/>
+                </a:solidFill>
+              </a:rPr>
+              <a:t>An alternative that I’d just found last week was something known as the Double-cut and Join model, which treats synteny blocks as nodes and their connections as edges, and uses a graph theoretic approach to come up with a DCJ score. This is something I want to try implementing, not just for assigning a score but also to identify breakpoints further down the workflow.</a:t>
+            </a:r>
+            <a:endParaRPr sz="1100" dirty="0">
               <a:solidFill>
                 <a:schemeClr val="dk1"/>
               </a:solidFill>
@@ -1242,7 +3213,66 @@
               <a:buFont typeface="Arial"/>
               <a:buNone/>
             </a:pPr>
-            <a:endParaRPr sz="1100">
+            <a:r>
+              <a:rPr lang="en-US" sz="1100" dirty="0">
+                <a:solidFill>
+                  <a:schemeClr val="dk1"/>
+                </a:solidFill>
+              </a:rPr>
+              <a:t>Another major problem that I ran into, is the size of the target sequences themselves. Because we stuck with animal mitochondrial genomes in the hope that the minimal amount of non-coding region content would help us in reducing any unwanted motifs from appearing, the sequences themselves are therefore tiny, something like 30 base pairs. The reason for keeping the window this short is also because, the smallest genes in the mitogenome are the tRNAs, and there are instances of individual, adjacent tRNAs swapping places, which means the signal must be in the very short window between them. </a:t>
+            </a:r>
+          </a:p>
+          <a:p>
+            <a:pPr marL="0" lvl="0" indent="0" algn="l" rtl="0">
+              <a:lnSpc>
+                <a:spcPct val="115000"/>
+              </a:lnSpc>
+              <a:spcBef>
+                <a:spcPts val="1200"/>
+              </a:spcBef>
+              <a:spcAft>
+                <a:spcPts val="1200"/>
+              </a:spcAft>
+              <a:buClr>
+                <a:schemeClr val="dk1"/>
+              </a:buClr>
+              <a:buSzPts val="1100"/>
+              <a:buFont typeface="Arial"/>
+              <a:buNone/>
+            </a:pPr>
+            <a:endParaRPr lang="en-US" sz="1100" dirty="0">
+              <a:solidFill>
+                <a:schemeClr val="dk1"/>
+              </a:solidFill>
+            </a:endParaRPr>
+          </a:p>
+          <a:p>
+            <a:pPr marL="0" lvl="0" indent="0" algn="l" rtl="0">
+              <a:lnSpc>
+                <a:spcPct val="115000"/>
+              </a:lnSpc>
+              <a:spcBef>
+                <a:spcPts val="1200"/>
+              </a:spcBef>
+              <a:spcAft>
+                <a:spcPts val="1200"/>
+              </a:spcAft>
+              <a:buClr>
+                <a:schemeClr val="dk1"/>
+              </a:buClr>
+              <a:buSzPts val="1100"/>
+              <a:buFont typeface="Arial"/>
+              <a:buNone/>
+            </a:pPr>
+            <a:r>
+              <a:rPr lang="en-US" sz="1100" dirty="0">
+                <a:solidFill>
+                  <a:schemeClr val="dk1"/>
+                </a:solidFill>
+              </a:rPr>
+              <a:t>And this then means using the motif vector as a metric will lead to problems. (Next slide)</a:t>
+            </a:r>
+            <a:endParaRPr sz="1100" dirty="0">
               <a:solidFill>
                 <a:schemeClr val="dk1"/>
               </a:solidFill>
@@ -1389,7 +3419,15 @@
               <a:buFont typeface="Arial"/>
               <a:buNone/>
             </a:pPr>
-            <a:endParaRPr sz="1100">
+            <a:r>
+              <a:rPr lang="en-US" sz="1100" dirty="0">
+                <a:solidFill>
+                  <a:schemeClr val="dk1"/>
+                </a:solidFill>
+              </a:rPr>
+              <a:t>Most of the vector will just be a bunch of zero motifs, owing to the sequence being that short. Also, it is unlikely that we would see any functionally significant motifs appear in these regions, since, barring a short stretch of non-coding DNA usually found around the TSS, there are no other regulatory elements observed in animal mitochondrial genomes. </a:t>
+            </a:r>
+            <a:endParaRPr sz="1100" dirty="0">
               <a:solidFill>
                 <a:schemeClr val="dk1"/>
               </a:solidFill>
@@ -1418,7 +3456,7 @@
         <p:cNvPr id="1" name="Shape 85">
           <a:extLst>
             <a:ext uri="{FF2B5EF4-FFF2-40B4-BE49-F238E27FC236}">
-              <a16:creationId xmlns:a16="http://schemas.microsoft.com/office/drawing/2014/main" id="{1F26E02A-0F8E-08A5-A96A-55EDC05BAB50}"/>
+              <a16:creationId xmlns:a16="http://schemas.microsoft.com/office/drawing/2014/main" id="{878E91CE-4296-8ABC-8E0C-5DB2A0C60809}"/>
             </a:ext>
           </a:extLst>
         </p:cNvPr>
@@ -1438,7 +3476,7 @@
           <p:cNvPr id="86" name="Google Shape;86;g2009b74a80d_0_138:notes">
             <a:extLst>
               <a:ext uri="{FF2B5EF4-FFF2-40B4-BE49-F238E27FC236}">
-                <a16:creationId xmlns:a16="http://schemas.microsoft.com/office/drawing/2014/main" id="{B3097C06-9271-79FD-904A-F756ED03F98A}"/>
+                <a16:creationId xmlns:a16="http://schemas.microsoft.com/office/drawing/2014/main" id="{C8B303E8-F0C4-0EED-B111-50ABB56E5B7D}"/>
               </a:ext>
             </a:extLst>
           </p:cNvPr>
@@ -1489,7 +3527,7 @@
           <p:cNvPr id="87" name="Google Shape;87;g2009b74a80d_0_138:notes">
             <a:extLst>
               <a:ext uri="{FF2B5EF4-FFF2-40B4-BE49-F238E27FC236}">
-                <a16:creationId xmlns:a16="http://schemas.microsoft.com/office/drawing/2014/main" id="{C8833236-01E9-5223-6339-4533410257F4}"/>
+                <a16:creationId xmlns:a16="http://schemas.microsoft.com/office/drawing/2014/main" id="{BE622486-02C2-0599-F603-D26819801E0F}"/>
               </a:ext>
             </a:extLst>
           </p:cNvPr>
@@ -1536,7 +3574,221 @@
               <a:buFont typeface="Arial"/>
               <a:buNone/>
             </a:pPr>
-            <a:endParaRPr sz="1100">
+            <a:r>
+              <a:rPr lang="en-US" sz="1100" dirty="0">
+                <a:solidFill>
+                  <a:schemeClr val="dk1"/>
+                </a:solidFill>
+              </a:rPr>
+              <a:t>Which means that performing a whole-vector correlation using these vectors will just show high correlation since most of the entries are zeroes. The next step was to see if we can truncate these vectors and then correlate them instead. But the problem is that since we don’t expect any motifs to appear in abundance, and therefore that probably won’t result in anything either. </a:t>
+            </a:r>
+          </a:p>
+          <a:p>
+            <a:pPr marL="0" lvl="0" indent="0" algn="l" rtl="0">
+              <a:lnSpc>
+                <a:spcPct val="115000"/>
+              </a:lnSpc>
+              <a:spcBef>
+                <a:spcPts val="1200"/>
+              </a:spcBef>
+              <a:spcAft>
+                <a:spcPts val="1200"/>
+              </a:spcAft>
+              <a:buClr>
+                <a:schemeClr val="dk1"/>
+              </a:buClr>
+              <a:buSzPts val="1100"/>
+              <a:buFont typeface="Arial"/>
+              <a:buNone/>
+            </a:pPr>
+            <a:endParaRPr lang="en-US" sz="1100" dirty="0">
+              <a:solidFill>
+                <a:schemeClr val="dk1"/>
+              </a:solidFill>
+            </a:endParaRPr>
+          </a:p>
+          <a:p>
+            <a:pPr marL="0" lvl="0" indent="0" algn="l" rtl="0">
+              <a:lnSpc>
+                <a:spcPct val="115000"/>
+              </a:lnSpc>
+              <a:spcBef>
+                <a:spcPts val="1200"/>
+              </a:spcBef>
+              <a:spcAft>
+                <a:spcPts val="1200"/>
+              </a:spcAft>
+              <a:buClr>
+                <a:schemeClr val="dk1"/>
+              </a:buClr>
+              <a:buSzPts val="1100"/>
+              <a:buFont typeface="Arial"/>
+              <a:buNone/>
+            </a:pPr>
+            <a:r>
+              <a:rPr lang="en-US" sz="1100" dirty="0">
+                <a:solidFill>
+                  <a:schemeClr val="dk1"/>
+                </a:solidFill>
+              </a:rPr>
+              <a:t>Why bother with the correlations at all? Because one of the original hopes was that we could use the motif vector to predict if there are any motifs associated with previously ‘unknown’ proteins in these sequences, besides the known ones. And this just becomes a lot more complicated to handle if correlating these sequences is this challenging. And on top of that we have to worry about, 1. the signal itself being lost when the chopping up happens, and 2. even if the signal is preserved, there is still the possibility of having evolutionary diverged over time.</a:t>
+            </a:r>
+            <a:endParaRPr sz="1100" dirty="0">
+              <a:solidFill>
+                <a:schemeClr val="dk1"/>
+              </a:solidFill>
+            </a:endParaRPr>
+          </a:p>
+        </p:txBody>
+      </p:sp>
+    </p:spTree>
+    <p:extLst>
+      <p:ext uri="{BB962C8B-B14F-4D97-AF65-F5344CB8AC3E}">
+        <p14:creationId xmlns:p14="http://schemas.microsoft.com/office/powerpoint/2010/main" val="199149715"/>
+      </p:ext>
+    </p:extLst>
+  </p:cSld>
+  <p:clrMapOvr>
+    <a:masterClrMapping/>
+  </p:clrMapOvr>
+</p:notes>
+</file>
+
+<file path=ppt/notesSlides/notesSlide9.xml><?xml version="1.0" encoding="utf-8"?>
+<p:notes xmlns:a="http://schemas.openxmlformats.org/drawingml/2006/main" xmlns:r="http://schemas.openxmlformats.org/officeDocument/2006/relationships" xmlns:p="http://schemas.openxmlformats.org/presentationml/2006/main" showMasterSp="0" showMasterPhAnim="0">
+  <p:cSld>
+    <p:spTree>
+      <p:nvGrpSpPr>
+        <p:cNvPr id="1" name="Shape 85">
+          <a:extLst>
+            <a:ext uri="{FF2B5EF4-FFF2-40B4-BE49-F238E27FC236}">
+              <a16:creationId xmlns:a16="http://schemas.microsoft.com/office/drawing/2014/main" id="{1F26E02A-0F8E-08A5-A96A-55EDC05BAB50}"/>
+            </a:ext>
+          </a:extLst>
+        </p:cNvPr>
+        <p:cNvGrpSpPr/>
+        <p:nvPr/>
+      </p:nvGrpSpPr>
+      <p:grpSpPr>
+        <a:xfrm>
+          <a:off x="0" y="0"/>
+          <a:ext cx="0" cy="0"/>
+          <a:chOff x="0" y="0"/>
+          <a:chExt cx="0" cy="0"/>
+        </a:xfrm>
+      </p:grpSpPr>
+      <p:sp>
+        <p:nvSpPr>
+          <p:cNvPr id="86" name="Google Shape;86;g2009b74a80d_0_138:notes">
+            <a:extLst>
+              <a:ext uri="{FF2B5EF4-FFF2-40B4-BE49-F238E27FC236}">
+                <a16:creationId xmlns:a16="http://schemas.microsoft.com/office/drawing/2014/main" id="{B3097C06-9271-79FD-904A-F756ED03F98A}"/>
+              </a:ext>
+            </a:extLst>
+          </p:cNvPr>
+          <p:cNvSpPr>
+            <a:spLocks noGrp="1" noRot="1" noChangeAspect="1"/>
+          </p:cNvSpPr>
+          <p:nvPr>
+            <p:ph type="sldImg" idx="2"/>
+          </p:nvPr>
+        </p:nvSpPr>
+        <p:spPr>
+          <a:xfrm>
+            <a:off x="217488" y="812800"/>
+            <a:ext cx="7124700" cy="4008438"/>
+          </a:xfrm>
+          <a:custGeom>
+            <a:avLst/>
+            <a:gdLst/>
+            <a:ahLst/>
+            <a:cxnLst/>
+            <a:rect l="l" t="t" r="r" b="b"/>
+            <a:pathLst>
+              <a:path w="120000" h="120000" extrusionOk="0">
+                <a:moveTo>
+                  <a:pt x="0" y="0"/>
+                </a:moveTo>
+                <a:lnTo>
+                  <a:pt x="120000" y="0"/>
+                </a:lnTo>
+                <a:lnTo>
+                  <a:pt x="120000" y="120000"/>
+                </a:lnTo>
+                <a:lnTo>
+                  <a:pt x="0" y="120000"/>
+                </a:lnTo>
+                <a:close/>
+              </a:path>
+            </a:pathLst>
+          </a:custGeom>
+          <a:noFill/>
+          <a:ln>
+            <a:noFill/>
+          </a:ln>
+        </p:spPr>
+      </p:sp>
+      <p:sp>
+        <p:nvSpPr>
+          <p:cNvPr id="87" name="Google Shape;87;g2009b74a80d_0_138:notes">
+            <a:extLst>
+              <a:ext uri="{FF2B5EF4-FFF2-40B4-BE49-F238E27FC236}">
+                <a16:creationId xmlns:a16="http://schemas.microsoft.com/office/drawing/2014/main" id="{C8833236-01E9-5223-6339-4533410257F4}"/>
+              </a:ext>
+            </a:extLst>
+          </p:cNvPr>
+          <p:cNvSpPr txBox="1">
+            <a:spLocks noGrp="1"/>
+          </p:cNvSpPr>
+          <p:nvPr>
+            <p:ph type="body" idx="1"/>
+          </p:nvPr>
+        </p:nvSpPr>
+        <p:spPr>
+          <a:xfrm>
+            <a:off x="756000" y="5078520"/>
+            <a:ext cx="6047700" cy="4811100"/>
+          </a:xfrm>
+          <a:prstGeom prst="rect">
+            <a:avLst/>
+          </a:prstGeom>
+          <a:noFill/>
+          <a:ln>
+            <a:noFill/>
+          </a:ln>
+        </p:spPr>
+        <p:txBody>
+          <a:bodyPr spcFirstLastPara="1" wrap="square" lIns="0" tIns="0" rIns="0" bIns="0" anchor="t" anchorCtr="0">
+            <a:noAutofit/>
+          </a:bodyPr>
+          <a:lstStyle/>
+          <a:p>
+            <a:pPr marL="0" lvl="0" indent="0" algn="l" rtl="0">
+              <a:lnSpc>
+                <a:spcPct val="115000"/>
+              </a:lnSpc>
+              <a:spcBef>
+                <a:spcPts val="1200"/>
+              </a:spcBef>
+              <a:spcAft>
+                <a:spcPts val="1200"/>
+              </a:spcAft>
+              <a:buClr>
+                <a:schemeClr val="dk1"/>
+              </a:buClr>
+              <a:buSzPts val="1100"/>
+              <a:buFont typeface="Arial"/>
+              <a:buNone/>
+            </a:pPr>
+            <a:r>
+              <a:rPr lang="en-US" sz="1100" dirty="0">
+                <a:solidFill>
+                  <a:schemeClr val="dk1"/>
+                </a:solidFill>
+              </a:rPr>
+              <a:t>Which means I am stuck with a matrix of vectors for all of these target sequences, most of which are zeroes. And the hope is that it will satisfy one of these two hypotheses. The first one is that, there is some protein machinery that recognizes these signals and carries out the translocations, and this happens by import from the nucleus into the mitochondria. So, I ChatGPT-ed a list of all known mechanisms by which gene sequences can move around within the nuclear genome, (I still have to verify most of these with existing literature) but the hope is that at least some of these motifs will show up in this matrix of vectors. The other is a purely biophysical explanation, which is that, AT-rich motifs are more prone to breaking, and therefore the motifs that we see in these sequences should have abundant AT nucleotides. I’ll have to use this matrix and verify one of these two hypotheses, based on which we will have some information on what to look for in 1. the nuclear genome, but also 2. in the other two datasets.</a:t>
+            </a:r>
+            <a:endParaRPr sz="1100" dirty="0">
               <a:solidFill>
                 <a:schemeClr val="dk1"/>
               </a:solidFill>
@@ -1706,7 +3958,7 @@
           <a:p>
             <a:fld id="{AECC3E18-D65A-4D77-B158-F2A3E1B2D42F}" type="datetimeFigureOut">
               <a:rPr lang="en-IN" smtClean="0"/>
-              <a:t>17-03-2025</a:t>
+              <a:t>19-03-2025</a:t>
             </a:fld>
             <a:endParaRPr lang="en-IN"/>
           </a:p>
@@ -1906,7 +4158,7 @@
           <a:p>
             <a:fld id="{AECC3E18-D65A-4D77-B158-F2A3E1B2D42F}" type="datetimeFigureOut">
               <a:rPr lang="en-IN" smtClean="0"/>
-              <a:t>17-03-2025</a:t>
+              <a:t>19-03-2025</a:t>
             </a:fld>
             <a:endParaRPr lang="en-IN"/>
           </a:p>
@@ -2116,7 +4368,7 @@
           <a:p>
             <a:fld id="{AECC3E18-D65A-4D77-B158-F2A3E1B2D42F}" type="datetimeFigureOut">
               <a:rPr lang="en-IN" smtClean="0"/>
-              <a:t>17-03-2025</a:t>
+              <a:t>19-03-2025</a:t>
             </a:fld>
             <a:endParaRPr lang="en-IN"/>
           </a:p>
@@ -2316,7 +4568,7 @@
           <a:p>
             <a:fld id="{AECC3E18-D65A-4D77-B158-F2A3E1B2D42F}" type="datetimeFigureOut">
               <a:rPr lang="en-IN" smtClean="0"/>
-              <a:t>17-03-2025</a:t>
+              <a:t>19-03-2025</a:t>
             </a:fld>
             <a:endParaRPr lang="en-IN"/>
           </a:p>
@@ -2592,7 +4844,7 @@
           <a:p>
             <a:fld id="{AECC3E18-D65A-4D77-B158-F2A3E1B2D42F}" type="datetimeFigureOut">
               <a:rPr lang="en-IN" smtClean="0"/>
-              <a:t>17-03-2025</a:t>
+              <a:t>19-03-2025</a:t>
             </a:fld>
             <a:endParaRPr lang="en-IN"/>
           </a:p>
@@ -2860,7 +5112,7 @@
           <a:p>
             <a:fld id="{AECC3E18-D65A-4D77-B158-F2A3E1B2D42F}" type="datetimeFigureOut">
               <a:rPr lang="en-IN" smtClean="0"/>
-              <a:t>17-03-2025</a:t>
+              <a:t>19-03-2025</a:t>
             </a:fld>
             <a:endParaRPr lang="en-IN"/>
           </a:p>
@@ -3275,7 +5527,7 @@
           <a:p>
             <a:fld id="{AECC3E18-D65A-4D77-B158-F2A3E1B2D42F}" type="datetimeFigureOut">
               <a:rPr lang="en-IN" smtClean="0"/>
-              <a:t>17-03-2025</a:t>
+              <a:t>19-03-2025</a:t>
             </a:fld>
             <a:endParaRPr lang="en-IN"/>
           </a:p>
@@ -3417,7 +5669,7 @@
           <a:p>
             <a:fld id="{AECC3E18-D65A-4D77-B158-F2A3E1B2D42F}" type="datetimeFigureOut">
               <a:rPr lang="en-IN" smtClean="0"/>
-              <a:t>17-03-2025</a:t>
+              <a:t>19-03-2025</a:t>
             </a:fld>
             <a:endParaRPr lang="en-IN"/>
           </a:p>
@@ -3530,7 +5782,7 @@
           <a:p>
             <a:fld id="{AECC3E18-D65A-4D77-B158-F2A3E1B2D42F}" type="datetimeFigureOut">
               <a:rPr lang="en-IN" smtClean="0"/>
-              <a:t>17-03-2025</a:t>
+              <a:t>19-03-2025</a:t>
             </a:fld>
             <a:endParaRPr lang="en-IN"/>
           </a:p>
@@ -3843,7 +6095,7 @@
           <a:p>
             <a:fld id="{AECC3E18-D65A-4D77-B158-F2A3E1B2D42F}" type="datetimeFigureOut">
               <a:rPr lang="en-IN" smtClean="0"/>
-              <a:t>17-03-2025</a:t>
+              <a:t>19-03-2025</a:t>
             </a:fld>
             <a:endParaRPr lang="en-IN"/>
           </a:p>
@@ -4132,7 +6384,7 @@
           <a:p>
             <a:fld id="{AECC3E18-D65A-4D77-B158-F2A3E1B2D42F}" type="datetimeFigureOut">
               <a:rPr lang="en-IN" smtClean="0"/>
-              <a:t>17-03-2025</a:t>
+              <a:t>19-03-2025</a:t>
             </a:fld>
             <a:endParaRPr lang="en-IN"/>
           </a:p>
@@ -4375,7 +6627,7 @@
           <a:p>
             <a:fld id="{AECC3E18-D65A-4D77-B158-F2A3E1B2D42F}" type="datetimeFigureOut">
               <a:rPr lang="en-IN" smtClean="0"/>
-              <a:t>17-03-2025</a:t>
+              <a:t>19-03-2025</a:t>
             </a:fld>
             <a:endParaRPr lang="en-IN"/>
           </a:p>
@@ -4780,7 +7032,13 @@
   <p:cSld>
     <p:spTree>
       <p:nvGrpSpPr>
-        <p:cNvPr id="1" name=""/>
+        <p:cNvPr id="1" name="">
+          <a:extLst>
+            <a:ext uri="{FF2B5EF4-FFF2-40B4-BE49-F238E27FC236}">
+              <a16:creationId xmlns:a16="http://schemas.microsoft.com/office/drawing/2014/main" id="{BE7F356F-F5E7-1816-B41C-1E8C0E628404}"/>
+            </a:ext>
+          </a:extLst>
+        </p:cNvPr>
         <p:cNvGrpSpPr/>
         <p:nvPr/>
       </p:nvGrpSpPr>
@@ -4797,7 +7055,7 @@
           <p:cNvPr id="2" name="Title 1">
             <a:extLst>
               <a:ext uri="{FF2B5EF4-FFF2-40B4-BE49-F238E27FC236}">
-                <a16:creationId xmlns:a16="http://schemas.microsoft.com/office/drawing/2014/main" id="{30F85529-BEA3-1BF7-4563-B0DFD4DB4D01}"/>
+                <a16:creationId xmlns:a16="http://schemas.microsoft.com/office/drawing/2014/main" id="{1255DB96-CD0F-48DD-006C-8A0ABF3B42DF}"/>
               </a:ext>
             </a:extLst>
           </p:cNvPr>
@@ -4841,7 +7099,7 @@
           <p:cNvPr id="3" name="Subtitle 2">
             <a:extLst>
               <a:ext uri="{FF2B5EF4-FFF2-40B4-BE49-F238E27FC236}">
-                <a16:creationId xmlns:a16="http://schemas.microsoft.com/office/drawing/2014/main" id="{C3DBBF8F-E017-B941-C4A4-C4B578F499D8}"/>
+                <a16:creationId xmlns:a16="http://schemas.microsoft.com/office/drawing/2014/main" id="{A7F2722B-D40E-7952-AFCF-BD480B4DCCF2}"/>
               </a:ext>
             </a:extLst>
           </p:cNvPr>
@@ -4854,7 +7112,9 @@
         </p:nvSpPr>
         <p:spPr/>
         <p:txBody>
-          <a:bodyPr/>
+          <a:bodyPr>
+            <a:normAutofit/>
+          </a:bodyPr>
           <a:lstStyle/>
           <a:p>
             <a:pPr marL="372239" marR="0" lvl="0" indent="0" algn="ctr" rtl="0">
@@ -4874,7 +7134,7 @@
               <a:buFont typeface="Arial"/>
               <a:buNone/>
             </a:pPr>
-            <a:endParaRPr lang="en-US" sz="2400" b="1" dirty="0"/>
+            <a:endParaRPr lang="en-US" sz="1800" b="1" dirty="0"/>
           </a:p>
           <a:p>
             <a:pPr marL="372239" marR="0" lvl="0" indent="0" algn="ctr" rtl="0">
@@ -4895,7 +7155,7 @@
               <a:buNone/>
             </a:pPr>
             <a:r>
-              <a:rPr lang="en-US" sz="2400" b="1" i="0" u="none" strike="noStrike" cap="none" dirty="0">
+              <a:rPr lang="en-US" sz="1800" b="1" i="0" u="none" strike="noStrike" cap="none" dirty="0">
                 <a:solidFill>
                   <a:srgbClr val="000000"/>
                 </a:solidFill>
@@ -4926,7 +7186,10 @@
               <a:buNone/>
             </a:pPr>
             <a:r>
-              <a:rPr lang="en-US" sz="2400" b="1" dirty="0"/>
+              <a:rPr lang="en-US" sz="1800" b="1" dirty="0">
+                <a:latin typeface="Arial" panose="020B0604020202020204" pitchFamily="34" charset="0"/>
+                <a:cs typeface="Arial" panose="020B0604020202020204" pitchFamily="34" charset="0"/>
+              </a:rPr>
               <a:t>Lab meeting: 19-03-25</a:t>
             </a:r>
           </a:p>
@@ -4935,7 +7198,7 @@
     </p:spTree>
     <p:extLst>
       <p:ext uri="{BB962C8B-B14F-4D97-AF65-F5344CB8AC3E}">
-        <p14:creationId xmlns:p14="http://schemas.microsoft.com/office/powerpoint/2010/main" val="1058523366"/>
+        <p14:creationId xmlns:p14="http://schemas.microsoft.com/office/powerpoint/2010/main" val="2884099701"/>
       </p:ext>
     </p:extLst>
   </p:cSld>
@@ -5416,7 +7679,7 @@
             </a:fld>
             <a:r>
               <a:rPr lang="en-IN" dirty="0"/>
-              <a:t>/8</a:t>
+              <a:t>/9</a:t>
             </a:r>
             <a:endParaRPr dirty="0"/>
           </a:p>
@@ -5562,7 +7825,7 @@
                 <a:cs typeface="Arial"/>
                 <a:sym typeface="Arial"/>
               </a:rPr>
-              <a:t>Animal mitochondrial genomes have nearly identical gene content</a:t>
+              <a:t>Animal mitochondrial genomes have nearly identical gene content, and is very small in number (~37)</a:t>
             </a:r>
           </a:p>
           <a:p>
@@ -6123,7 +8386,7 @@
             </a:fld>
             <a:r>
               <a:rPr lang="en-IN" dirty="0"/>
-              <a:t>/8</a:t>
+              <a:t>/9</a:t>
             </a:r>
             <a:endParaRPr dirty="0"/>
           </a:p>
@@ -6144,7 +8407,7 @@
         <p:spPr>
           <a:xfrm>
             <a:off x="273050" y="1720850"/>
-            <a:ext cx="11656604" cy="3365024"/>
+            <a:ext cx="11656604" cy="2949525"/>
           </a:xfrm>
           <a:prstGeom prst="rect">
             <a:avLst/>
@@ -6177,7 +8440,7 @@
                 <a:cs typeface="Arial"/>
                 <a:sym typeface="Arial"/>
               </a:rPr>
-              <a:t>tart with a dataset of available mitochondrial genomes, and an ordered list of their genes starting from the Transcription Start Site (TSS).</a:t>
+              <a:t>tart with a dataset of available mitochondrial genomes, and an ordered list of their genes.</a:t>
             </a:r>
           </a:p>
           <a:p>
@@ -6765,7 +9028,7 @@
             </a:fld>
             <a:r>
               <a:rPr lang="en-IN" dirty="0"/>
-              <a:t>/8</a:t>
+              <a:t>/9</a:t>
             </a:r>
             <a:endParaRPr dirty="0"/>
           </a:p>
@@ -7315,7 +9578,7 @@
             </a:fld>
             <a:r>
               <a:rPr lang="en-IN" dirty="0"/>
-              <a:t>/8</a:t>
+              <a:t>/9</a:t>
             </a:r>
             <a:endParaRPr dirty="0"/>
           </a:p>
@@ -7357,12 +9620,20 @@
               <a:buAutoNum type="arabicPeriod"/>
             </a:pPr>
             <a:r>
-              <a:rPr lang="en-US" dirty="0" err="1">
+              <a:rPr lang="en-US" b="1" dirty="0" err="1">
                 <a:latin typeface="Arial"/>
                 <a:cs typeface="Arial"/>
                 <a:sym typeface="Arial"/>
               </a:rPr>
               <a:t>Levenshtein</a:t>
+            </a:r>
+            <a:r>
+              <a:rPr lang="en-US" b="1" dirty="0">
+                <a:latin typeface="Arial"/>
+                <a:cs typeface="Arial"/>
+                <a:sym typeface="Arial"/>
+              </a:rPr>
+              <a:t>-Distance Score</a:t>
             </a:r>
             <a:r>
               <a:rPr lang="en-US" dirty="0">
@@ -7370,7 +9641,7 @@
                 <a:cs typeface="Arial"/>
                 <a:sym typeface="Arial"/>
               </a:rPr>
-              <a:t>-Distance Score (a DP, edit-based metric)</a:t>
+              <a:t> (a DP, edit-based metric)</a:t>
             </a:r>
           </a:p>
           <a:p>
@@ -7387,19 +9658,6 @@
             </a:endParaRPr>
           </a:p>
           <a:p>
-            <a:pPr marL="342900" indent="-342900">
-              <a:lnSpc>
-                <a:spcPct val="150000"/>
-              </a:lnSpc>
-              <a:buAutoNum type="arabicPeriod"/>
-            </a:pPr>
-            <a:endParaRPr lang="en-US" dirty="0">
-              <a:latin typeface="Arial"/>
-              <a:cs typeface="Arial"/>
-              <a:sym typeface="Arial"/>
-            </a:endParaRPr>
-          </a:p>
-          <a:p>
             <a:pPr lvl="1">
               <a:lnSpc>
                 <a:spcPct val="150000"/>
@@ -7412,22 +9670,6 @@
             </a:endParaRPr>
           </a:p>
           <a:p>
-            <a:pPr marL="342900" indent="-342900">
-              <a:lnSpc>
-                <a:spcPct val="150000"/>
-              </a:lnSpc>
-              <a:buAutoNum type="arabicPeriod"/>
-            </a:pPr>
-            <a:r>
-              <a:rPr lang="en-US" dirty="0">
-                <a:latin typeface="Arial"/>
-                <a:cs typeface="Arial"/>
-                <a:sym typeface="Arial"/>
-              </a:rPr>
-              <a:t>Double-cut and Join Model (a graph-based metric)</a:t>
-            </a:r>
-          </a:p>
-          <a:p>
             <a:pPr lvl="1">
               <a:lnSpc>
                 <a:spcPct val="150000"/>
@@ -7457,14 +9699,184 @@
                 <a:spcPct val="150000"/>
               </a:lnSpc>
             </a:pPr>
-            <a:endParaRPr lang="en-IN" dirty="0">
+            <a:endParaRPr lang="en-US" dirty="0">
               <a:latin typeface="Arial"/>
               <a:cs typeface="Arial"/>
               <a:sym typeface="Arial"/>
             </a:endParaRPr>
           </a:p>
-        </p:txBody>
-      </p:sp>
+          <a:p>
+            <a:pPr lvl="1">
+              <a:lnSpc>
+                <a:spcPct val="150000"/>
+              </a:lnSpc>
+            </a:pPr>
+            <a:endParaRPr lang="en-US" dirty="0">
+              <a:latin typeface="Arial"/>
+              <a:cs typeface="Arial"/>
+              <a:sym typeface="Arial"/>
+            </a:endParaRPr>
+          </a:p>
+          <a:p>
+            <a:pPr marL="342900" indent="-342900">
+              <a:lnSpc>
+                <a:spcPct val="150000"/>
+              </a:lnSpc>
+              <a:buAutoNum type="arabicPeriod"/>
+            </a:pPr>
+            <a:r>
+              <a:rPr lang="en-US" b="1" dirty="0">
+                <a:latin typeface="Arial"/>
+                <a:cs typeface="Arial"/>
+                <a:sym typeface="Arial"/>
+              </a:rPr>
+              <a:t>Double-cut and Join Model</a:t>
+            </a:r>
+            <a:r>
+              <a:rPr lang="en-US" dirty="0">
+                <a:latin typeface="Arial"/>
+                <a:cs typeface="Arial"/>
+                <a:sym typeface="Arial"/>
+              </a:rPr>
+              <a:t> (a graph-based metric)</a:t>
+            </a:r>
+          </a:p>
+        </p:txBody>
+      </p:sp>
+      <p:sp>
+        <p:nvSpPr>
+          <p:cNvPr id="2" name="Google Shape;388;g2762e187aa4_1_1348">
+            <a:extLst>
+              <a:ext uri="{FF2B5EF4-FFF2-40B4-BE49-F238E27FC236}">
+                <a16:creationId xmlns:a16="http://schemas.microsoft.com/office/drawing/2014/main" id="{0E1ACA79-A862-6B4E-C606-9621D7A67839}"/>
+              </a:ext>
+            </a:extLst>
+          </p:cNvPr>
+          <p:cNvSpPr txBox="1"/>
+          <p:nvPr/>
+        </p:nvSpPr>
+        <p:spPr>
+          <a:xfrm>
+            <a:off x="426892" y="6173731"/>
+            <a:ext cx="10373904" cy="164920"/>
+          </a:xfrm>
+          <a:prstGeom prst="rect">
+            <a:avLst/>
+          </a:prstGeom>
+          <a:noFill/>
+          <a:ln>
+            <a:noFill/>
+          </a:ln>
+        </p:spPr>
+        <p:txBody>
+          <a:bodyPr spcFirstLastPara="1" wrap="square" lIns="0" tIns="10925" rIns="0" bIns="0" anchor="t" anchorCtr="0">
+            <a:spAutoFit/>
+          </a:bodyPr>
+          <a:lstStyle/>
+          <a:p>
+            <a:pPr marL="0" lvl="0" indent="0" algn="l" rtl="0">
+              <a:lnSpc>
+                <a:spcPct val="100000"/>
+              </a:lnSpc>
+              <a:spcBef>
+                <a:spcPts val="0"/>
+              </a:spcBef>
+              <a:spcAft>
+                <a:spcPts val="0"/>
+              </a:spcAft>
+              <a:buNone/>
+            </a:pPr>
+            <a:r>
+              <a:rPr lang="en-US" sz="1000" dirty="0"/>
+              <a:t>Shao, M., Lin, Y. and Moret, B.M.E., 2015. An exact algorithm to compute the double-cut-and-join distance for genomes with duplicate genes. </a:t>
+            </a:r>
+            <a:r>
+              <a:rPr lang="en-US" sz="1000" i="1" dirty="0"/>
+              <a:t>Journal of Computational Biology</a:t>
+            </a:r>
+            <a:r>
+              <a:rPr lang="en-US" sz="1000" dirty="0"/>
+              <a:t>, 22(5).</a:t>
+            </a:r>
+            <a:endParaRPr lang="en-IN" sz="1000" dirty="0"/>
+          </a:p>
+        </p:txBody>
+      </p:sp>
+      <p:sp>
+        <p:nvSpPr>
+          <p:cNvPr id="4" name="AutoShape 2" descr="{\displaystyle d_{a,b}(i,j)=\min {\begin{cases}0&amp;{\text{if }}i=j=0,\\d_{a,b}(i-1,j)+1&amp;{\text{if }}i&gt;0,\\d_{a,b}(i,j-1)+1&amp;{\text{if }}j&gt;0,\\d_{a,b}(i-1,j-1)+1_{(a_{i}\neq b_{j})}&amp;{\text{if }}i,j&gt;0,\\d_{a,b}(i-2,j-2)+1_{(a_{i}\neq b_{j})}&amp;{\text{if }}i,j&gt;1{\text{ and }}a_{i}=b_{j-1}{\text{ and }}a_{i-1}=b_{j},\\\end{cases}}}">
+            <a:extLst>
+              <a:ext uri="{FF2B5EF4-FFF2-40B4-BE49-F238E27FC236}">
+                <a16:creationId xmlns:a16="http://schemas.microsoft.com/office/drawing/2014/main" id="{66B48714-B43A-A9FE-4E87-3F038C211A3E}"/>
+              </a:ext>
+            </a:extLst>
+          </p:cNvPr>
+          <p:cNvSpPr>
+            <a:spLocks noChangeAspect="1" noChangeArrowheads="1"/>
+          </p:cNvSpPr>
+          <p:nvPr/>
+        </p:nvSpPr>
+        <p:spPr bwMode="auto">
+          <a:xfrm>
+            <a:off x="5943600" y="3276600"/>
+            <a:ext cx="304800" cy="304800"/>
+          </a:xfrm>
+          <a:prstGeom prst="rect">
+            <a:avLst/>
+          </a:prstGeom>
+          <a:noFill/>
+          <a:extLst>
+            <a:ext uri="{909E8E84-426E-40DD-AFC4-6F175D3DCCD1}">
+              <a14:hiddenFill xmlns:a14="http://schemas.microsoft.com/office/drawing/2010/main">
+                <a:solidFill>
+                  <a:srgbClr val="FFFFFF"/>
+                </a:solidFill>
+              </a14:hiddenFill>
+            </a:ext>
+          </a:extLst>
+        </p:spPr>
+        <p:txBody>
+          <a:bodyPr vert="horz" wrap="square" lIns="91440" tIns="45720" rIns="91440" bIns="45720" numCol="1" anchor="t" anchorCtr="0" compatLnSpc="1">
+            <a:prstTxWarp prst="textNoShape">
+              <a:avLst/>
+            </a:prstTxWarp>
+          </a:bodyPr>
+          <a:lstStyle/>
+          <a:p>
+            <a:endParaRPr lang="en-IN"/>
+          </a:p>
+        </p:txBody>
+      </p:sp>
+      <p:pic>
+        <p:nvPicPr>
+          <p:cNvPr id="6" name="Picture 5">
+            <a:extLst>
+              <a:ext uri="{FF2B5EF4-FFF2-40B4-BE49-F238E27FC236}">
+                <a16:creationId xmlns:a16="http://schemas.microsoft.com/office/drawing/2014/main" id="{82AE8108-FAD0-5F7A-7275-88999D8C3F60}"/>
+              </a:ext>
+            </a:extLst>
+          </p:cNvPr>
+          <p:cNvPicPr>
+            <a:picLocks noChangeAspect="1"/>
+          </p:cNvPicPr>
+          <p:nvPr/>
+        </p:nvPicPr>
+        <p:blipFill>
+          <a:blip r:embed="rId3"/>
+          <a:stretch>
+            <a:fillRect/>
+          </a:stretch>
+        </p:blipFill>
+        <p:spPr>
+          <a:xfrm>
+            <a:off x="1668271" y="2615708"/>
+            <a:ext cx="8550658" cy="1575308"/>
+          </a:xfrm>
+          <a:prstGeom prst="rect">
+            <a:avLst/>
+          </a:prstGeom>
+        </p:spPr>
+      </p:pic>
     </p:spTree>
     <p:extLst>
       <p:ext uri="{BB962C8B-B14F-4D97-AF65-F5344CB8AC3E}">
@@ -8009,9 +10421,8 @@
             </a:fld>
             <a:r>
               <a:rPr lang="en-IN" dirty="0"/>
-              <a:t>/8</a:t>
-            </a:r>
-            <a:endParaRPr dirty="0"/>
+              <a:t>/9</a:t>
+            </a:r>
           </a:p>
         </p:txBody>
       </p:sp>
@@ -8300,12 +10711,6 @@
               <a:rPr lang="en-IN" sz="1000" dirty="0"/>
               <a:t>., 44, 660–674.</a:t>
             </a:r>
-            <a:endParaRPr sz="1000" i="1" dirty="0">
-              <a:latin typeface="Calibri"/>
-              <a:ea typeface="Calibri"/>
-              <a:cs typeface="Calibri"/>
-              <a:sym typeface="Calibri"/>
-            </a:endParaRPr>
           </a:p>
         </p:txBody>
       </p:sp>
@@ -8853,7 +11258,7 @@
             </a:fld>
             <a:r>
               <a:rPr lang="en-IN" dirty="0"/>
-              <a:t>/8</a:t>
+              <a:t>/9</a:t>
             </a:r>
             <a:endParaRPr dirty="0"/>
           </a:p>
@@ -8874,7 +11279,7 @@
         <p:spPr>
           <a:xfrm>
             <a:off x="273050" y="1720850"/>
-            <a:ext cx="11656604" cy="4611519"/>
+            <a:ext cx="11656604" cy="1703030"/>
           </a:xfrm>
           <a:prstGeom prst="rect">
             <a:avLst/>
@@ -8900,7 +11305,7 @@
                 <a:cs typeface="Arial"/>
                 <a:sym typeface="Arial"/>
               </a:rPr>
-              <a:t>For a sequence length of 60 bases, if we were to construct a 5-mer vector of length 512 for this sequence, we would end up with only about 512-60+1 non-zero entries in this vector</a:t>
+              <a:t>For a sequence length of 30 bases, if we were to construct a 5-mer vector of length 512 for this sequence, we would end up with only about 512-30+1 non-zero entries in this vector</a:t>
             </a:r>
           </a:p>
           <a:p>
@@ -8918,69 +11323,6 @@
                 <a:sym typeface="Arial"/>
               </a:rPr>
               <a:t>Most of the whole vectors will therefore have a high correlation with each other owing to multiple entries being zeroes.</a:t>
-            </a:r>
-          </a:p>
-          <a:p>
-            <a:pPr marL="285750" indent="-285750">
-              <a:lnSpc>
-                <a:spcPct val="150000"/>
-              </a:lnSpc>
-              <a:buFontTx/>
-              <a:buChar char="-"/>
-            </a:pPr>
-            <a:r>
-              <a:rPr lang="en-US" dirty="0">
-                <a:latin typeface="Arial"/>
-                <a:cs typeface="Arial"/>
-                <a:sym typeface="Arial"/>
-              </a:rPr>
-              <a:t>Assigning a cutoff before performing a correlation is very dicey, since none of the motifs are expected to be ‘abundant’ in any way since they do not correspond to any functional regulation.</a:t>
-            </a:r>
-          </a:p>
-          <a:p>
-            <a:pPr marL="285750" indent="-285750">
-              <a:lnSpc>
-                <a:spcPct val="150000"/>
-              </a:lnSpc>
-              <a:buFontTx/>
-              <a:buChar char="-"/>
-            </a:pPr>
-            <a:r>
-              <a:rPr lang="en-US" dirty="0">
-                <a:latin typeface="Arial"/>
-                <a:cs typeface="Arial"/>
-                <a:sym typeface="Arial"/>
-              </a:rPr>
-              <a:t>Therefore, using motif distributions to extrapolate and obtain ‘unknown’ motifs becomes even more trickier</a:t>
-            </a:r>
-          </a:p>
-          <a:p>
-            <a:pPr>
-              <a:lnSpc>
-                <a:spcPct val="150000"/>
-              </a:lnSpc>
-            </a:pPr>
-            <a:endParaRPr lang="en-US" dirty="0">
-              <a:latin typeface="Arial"/>
-              <a:cs typeface="Arial"/>
-              <a:sym typeface="Arial"/>
-            </a:endParaRPr>
-          </a:p>
-          <a:p>
-            <a:pPr marL="285750" indent="-285750">
-              <a:lnSpc>
-                <a:spcPct val="150000"/>
-              </a:lnSpc>
-              <a:buFontTx/>
-              <a:buChar char="-"/>
-            </a:pPr>
-            <a:r>
-              <a:rPr lang="en-US" dirty="0">
-                <a:latin typeface="Arial"/>
-                <a:cs typeface="Arial"/>
-                <a:sym typeface="Arial"/>
-              </a:rPr>
-              <a:t>One more problem is, if the unknown protein(s) chopped up the motif right in the middle, then we would never be able to detect it post-translocation. Things become further complicated if the sequences evolutionarily diverge over time.</a:t>
             </a:r>
           </a:p>
         </p:txBody>
@@ -9006,7 +11348,7 @@
         <p:cNvPr id="1" name="Shape 88">
           <a:extLst>
             <a:ext uri="{FF2B5EF4-FFF2-40B4-BE49-F238E27FC236}">
-              <a16:creationId xmlns:a16="http://schemas.microsoft.com/office/drawing/2014/main" id="{24F86B0D-900B-C2C8-C5D1-8359360693EF}"/>
+              <a16:creationId xmlns:a16="http://schemas.microsoft.com/office/drawing/2014/main" id="{28DAC2BC-A694-0337-B1E0-1182C9C8FCF1}"/>
             </a:ext>
           </a:extLst>
         </p:cNvPr>
@@ -9026,7 +11368,7 @@
           <p:cNvPr id="89" name="Google Shape;89;g2009b74a80d_0_138">
             <a:extLst>
               <a:ext uri="{FF2B5EF4-FFF2-40B4-BE49-F238E27FC236}">
-                <a16:creationId xmlns:a16="http://schemas.microsoft.com/office/drawing/2014/main" id="{C583F86E-B61D-7DFB-1547-6F3119B154B7}"/>
+                <a16:creationId xmlns:a16="http://schemas.microsoft.com/office/drawing/2014/main" id="{B6372CD2-AD9A-A7F9-7B40-2815AD0F9C13}"/>
               </a:ext>
             </a:extLst>
           </p:cNvPr>
@@ -9072,7 +11414,7 @@
           <p:cNvPr id="90" name="Google Shape;90;g2009b74a80d_0_138">
             <a:extLst>
               <a:ext uri="{FF2B5EF4-FFF2-40B4-BE49-F238E27FC236}">
-                <a16:creationId xmlns:a16="http://schemas.microsoft.com/office/drawing/2014/main" id="{60328EEA-92F8-7EDB-69F7-D2E9E844FE33}"/>
+                <a16:creationId xmlns:a16="http://schemas.microsoft.com/office/drawing/2014/main" id="{C27301E8-B29B-FC84-3CC8-25FD70E59637}"/>
               </a:ext>
             </a:extLst>
           </p:cNvPr>
@@ -9133,7 +11475,7 @@
           <p:cNvPr id="91" name="Google Shape;91;g2009b74a80d_0_138">
             <a:extLst>
               <a:ext uri="{FF2B5EF4-FFF2-40B4-BE49-F238E27FC236}">
-                <a16:creationId xmlns:a16="http://schemas.microsoft.com/office/drawing/2014/main" id="{A8912C3B-1B0E-7C10-B6B3-5261672A104C}"/>
+                <a16:creationId xmlns:a16="http://schemas.microsoft.com/office/drawing/2014/main" id="{DF1E40C9-663F-A4C5-6359-F977DB6B348C}"/>
               </a:ext>
             </a:extLst>
           </p:cNvPr>
@@ -9168,7 +11510,7 @@
             <a:r>
               <a:rPr lang="en-IN" sz="1935" b="1" i="1" dirty="0">
                 <a:solidFill>
-                  <a:srgbClr val="CCCCCC"/>
+                  <a:srgbClr val="666666"/>
                 </a:solidFill>
                 <a:latin typeface="Arial"/>
                 <a:ea typeface="Arial"/>
@@ -9194,7 +11536,7 @@
           <p:cNvPr id="92" name="Google Shape;92;g2009b74a80d_0_138">
             <a:extLst>
               <a:ext uri="{FF2B5EF4-FFF2-40B4-BE49-F238E27FC236}">
-                <a16:creationId xmlns:a16="http://schemas.microsoft.com/office/drawing/2014/main" id="{4301DA9E-678B-3F48-CF15-5BA32C76C3D5}"/>
+                <a16:creationId xmlns:a16="http://schemas.microsoft.com/office/drawing/2014/main" id="{F6CDFB86-DF47-ACA3-66CB-C7E5D57A3C8E}"/>
               </a:ext>
             </a:extLst>
           </p:cNvPr>
@@ -9255,7 +11597,7 @@
           <p:cNvPr id="93" name="Google Shape;93;g2009b74a80d_0_138">
             <a:extLst>
               <a:ext uri="{FF2B5EF4-FFF2-40B4-BE49-F238E27FC236}">
-                <a16:creationId xmlns:a16="http://schemas.microsoft.com/office/drawing/2014/main" id="{96F93EEA-6DE3-655E-63FB-EF83DDC47DBF}"/>
+                <a16:creationId xmlns:a16="http://schemas.microsoft.com/office/drawing/2014/main" id="{43CAAA75-1713-036E-D918-C2712642C91D}"/>
               </a:ext>
             </a:extLst>
           </p:cNvPr>
@@ -9316,7 +11658,7 @@
           <p:cNvPr id="94" name="Google Shape;94;g2009b74a80d_0_138">
             <a:extLst>
               <a:ext uri="{FF2B5EF4-FFF2-40B4-BE49-F238E27FC236}">
-                <a16:creationId xmlns:a16="http://schemas.microsoft.com/office/drawing/2014/main" id="{C034FBAB-1317-CD1C-8035-DD71D1490B73}"/>
+                <a16:creationId xmlns:a16="http://schemas.microsoft.com/office/drawing/2014/main" id="{9C1B9624-CA1B-181D-A849-58C444B8748B}"/>
               </a:ext>
             </a:extLst>
           </p:cNvPr>
@@ -9349,9 +11691,9 @@
               <a:buSzPts val="1600"/>
             </a:pPr>
             <a:r>
-              <a:rPr lang="en-IN" sz="1935" b="1" i="1" dirty="0">
-                <a:solidFill>
-                  <a:srgbClr val="666666"/>
+              <a:rPr lang="en-IN" sz="1935" b="1" i="1">
+                <a:solidFill>
+                  <a:srgbClr val="CCCCCC"/>
                 </a:solidFill>
                 <a:latin typeface="Arial"/>
                 <a:ea typeface="Arial"/>
@@ -9360,7 +11702,7 @@
               </a:rPr>
               <a:t>Future Work</a:t>
             </a:r>
-            <a:endParaRPr sz="1935" dirty="0">
+            <a:endParaRPr sz="1935">
               <a:solidFill>
                 <a:srgbClr val="000000"/>
               </a:solidFill>
@@ -9377,7 +11719,7 @@
           <p:cNvPr id="95" name="Google Shape;95;g2009b74a80d_0_138">
             <a:extLst>
               <a:ext uri="{FF2B5EF4-FFF2-40B4-BE49-F238E27FC236}">
-                <a16:creationId xmlns:a16="http://schemas.microsoft.com/office/drawing/2014/main" id="{106A02D3-DF64-95BF-65F4-2DB8CFAB11D4}"/>
+                <a16:creationId xmlns:a16="http://schemas.microsoft.com/office/drawing/2014/main" id="{F27F0783-4334-F489-B93B-F2F28FA30438}"/>
               </a:ext>
             </a:extLst>
           </p:cNvPr>
@@ -9419,7 +11761,7 @@
                 <a:cs typeface="Arial"/>
                 <a:sym typeface="Arial"/>
               </a:rPr>
-              <a:t>A molecular signal-hypothesis vs. a biophysical explanation</a:t>
+              <a:t>Correlations between vectors?</a:t>
             </a:r>
             <a:endParaRPr sz="3200" dirty="0">
               <a:solidFill>
@@ -9438,7 +11780,7 @@
           <p:cNvPr id="96" name="Google Shape;96;g2009b74a80d_0_138">
             <a:extLst>
               <a:ext uri="{FF2B5EF4-FFF2-40B4-BE49-F238E27FC236}">
-                <a16:creationId xmlns:a16="http://schemas.microsoft.com/office/drawing/2014/main" id="{5364D065-FC1D-EC7B-CB7F-E9A3B25C43BA}"/>
+                <a16:creationId xmlns:a16="http://schemas.microsoft.com/office/drawing/2014/main" id="{B83A4CD0-3744-A7EA-2625-A0C02A0E5E73}"/>
               </a:ext>
             </a:extLst>
           </p:cNvPr>
@@ -9487,7 +11829,7 @@
           <p:cNvPr id="97" name="Google Shape;97;g2009b74a80d_0_138">
             <a:extLst>
               <a:ext uri="{FF2B5EF4-FFF2-40B4-BE49-F238E27FC236}">
-                <a16:creationId xmlns:a16="http://schemas.microsoft.com/office/drawing/2014/main" id="{D178A29C-E9AF-F285-05E3-F71B53E4129D}"/>
+                <a16:creationId xmlns:a16="http://schemas.microsoft.com/office/drawing/2014/main" id="{FC2C4B9D-EDB9-E1C5-8AB3-4B18C1F1BFD3}"/>
               </a:ext>
             </a:extLst>
           </p:cNvPr>
@@ -9529,7 +11871,661 @@
             </a:fld>
             <a:r>
               <a:rPr lang="en-IN" dirty="0"/>
-              <a:t>/8</a:t>
+              <a:t>/9</a:t>
+            </a:r>
+            <a:endParaRPr dirty="0"/>
+          </a:p>
+        </p:txBody>
+      </p:sp>
+      <p:sp>
+        <p:nvSpPr>
+          <p:cNvPr id="3" name="TextBox 2">
+            <a:extLst>
+              <a:ext uri="{FF2B5EF4-FFF2-40B4-BE49-F238E27FC236}">
+                <a16:creationId xmlns:a16="http://schemas.microsoft.com/office/drawing/2014/main" id="{BA1B8FEC-5970-E211-FD91-750D75FE5B3E}"/>
+              </a:ext>
+            </a:extLst>
+          </p:cNvPr>
+          <p:cNvSpPr txBox="1"/>
+          <p:nvPr/>
+        </p:nvSpPr>
+        <p:spPr>
+          <a:xfrm>
+            <a:off x="273050" y="1720850"/>
+            <a:ext cx="11656604" cy="3365024"/>
+          </a:xfrm>
+          <a:prstGeom prst="rect">
+            <a:avLst/>
+          </a:prstGeom>
+          <a:noFill/>
+        </p:spPr>
+        <p:txBody>
+          <a:bodyPr wrap="square" rtlCol="0">
+            <a:spAutoFit/>
+          </a:bodyPr>
+          <a:lstStyle/>
+          <a:p>
+            <a:pPr marL="285750" indent="-285750">
+              <a:lnSpc>
+                <a:spcPct val="150000"/>
+              </a:lnSpc>
+              <a:buFontTx/>
+              <a:buChar char="-"/>
+            </a:pPr>
+            <a:r>
+              <a:rPr lang="en-US" dirty="0">
+                <a:latin typeface="Arial"/>
+                <a:cs typeface="Arial"/>
+                <a:sym typeface="Arial"/>
+              </a:rPr>
+              <a:t>Assigning a cutoff before performing a correlation is very dicey, since none of the motifs are expected to be ‘abundant’ in any way since they do not correspond to any functional regulation.</a:t>
+            </a:r>
+          </a:p>
+          <a:p>
+            <a:pPr marL="285750" indent="-285750">
+              <a:lnSpc>
+                <a:spcPct val="150000"/>
+              </a:lnSpc>
+              <a:buFontTx/>
+              <a:buChar char="-"/>
+            </a:pPr>
+            <a:r>
+              <a:rPr lang="en-US" dirty="0">
+                <a:latin typeface="Arial"/>
+                <a:cs typeface="Arial"/>
+                <a:sym typeface="Arial"/>
+              </a:rPr>
+              <a:t>Therefore, using motif distributions to extrapolate and obtain ‘unknown’ motifs becomes even more trickier</a:t>
+            </a:r>
+          </a:p>
+          <a:p>
+            <a:pPr>
+              <a:lnSpc>
+                <a:spcPct val="150000"/>
+              </a:lnSpc>
+            </a:pPr>
+            <a:endParaRPr lang="en-US" dirty="0">
+              <a:latin typeface="Arial"/>
+              <a:cs typeface="Arial"/>
+              <a:sym typeface="Arial"/>
+            </a:endParaRPr>
+          </a:p>
+          <a:p>
+            <a:pPr>
+              <a:lnSpc>
+                <a:spcPct val="150000"/>
+              </a:lnSpc>
+            </a:pPr>
+            <a:endParaRPr lang="en-US" dirty="0">
+              <a:latin typeface="Arial"/>
+              <a:cs typeface="Arial"/>
+              <a:sym typeface="Arial"/>
+            </a:endParaRPr>
+          </a:p>
+          <a:p>
+            <a:pPr marL="285750" indent="-285750">
+              <a:lnSpc>
+                <a:spcPct val="150000"/>
+              </a:lnSpc>
+              <a:buFontTx/>
+              <a:buChar char="-"/>
+            </a:pPr>
+            <a:r>
+              <a:rPr lang="en-US" dirty="0">
+                <a:latin typeface="Arial"/>
+                <a:cs typeface="Arial"/>
+                <a:sym typeface="Arial"/>
+              </a:rPr>
+              <a:t>One more problem is, if the unknown protein(s) chopped up the motif right in the middle, then we would never be able to detect it post-translocation. Things become further complicated if the sequences evolutionarily diverge over time.</a:t>
+            </a:r>
+          </a:p>
+        </p:txBody>
+      </p:sp>
+    </p:spTree>
+    <p:extLst>
+      <p:ext uri="{BB962C8B-B14F-4D97-AF65-F5344CB8AC3E}">
+        <p14:creationId xmlns:p14="http://schemas.microsoft.com/office/powerpoint/2010/main" val="3077646329"/>
+      </p:ext>
+    </p:extLst>
+  </p:cSld>
+  <p:clrMapOvr>
+    <a:masterClrMapping/>
+  </p:clrMapOvr>
+</p:sld>
+</file>
+
+<file path=ppt/slides/slide9.xml><?xml version="1.0" encoding="utf-8"?>
+<p:sld xmlns:a="http://schemas.openxmlformats.org/drawingml/2006/main" xmlns:r="http://schemas.openxmlformats.org/officeDocument/2006/relationships" xmlns:p="http://schemas.openxmlformats.org/presentationml/2006/main">
+  <p:cSld>
+    <p:spTree>
+      <p:nvGrpSpPr>
+        <p:cNvPr id="1" name="Shape 88">
+          <a:extLst>
+            <a:ext uri="{FF2B5EF4-FFF2-40B4-BE49-F238E27FC236}">
+              <a16:creationId xmlns:a16="http://schemas.microsoft.com/office/drawing/2014/main" id="{24F86B0D-900B-C2C8-C5D1-8359360693EF}"/>
+            </a:ext>
+          </a:extLst>
+        </p:cNvPr>
+        <p:cNvGrpSpPr/>
+        <p:nvPr/>
+      </p:nvGrpSpPr>
+      <p:grpSpPr>
+        <a:xfrm>
+          <a:off x="0" y="0"/>
+          <a:ext cx="0" cy="0"/>
+          <a:chOff x="0" y="0"/>
+          <a:chExt cx="0" cy="0"/>
+        </a:xfrm>
+      </p:grpSpPr>
+      <p:sp>
+        <p:nvSpPr>
+          <p:cNvPr id="89" name="Google Shape;89;g2009b74a80d_0_138">
+            <a:extLst>
+              <a:ext uri="{FF2B5EF4-FFF2-40B4-BE49-F238E27FC236}">
+                <a16:creationId xmlns:a16="http://schemas.microsoft.com/office/drawing/2014/main" id="{C583F86E-B61D-7DFB-1547-6F3119B154B7}"/>
+              </a:ext>
+            </a:extLst>
+          </p:cNvPr>
+          <p:cNvSpPr/>
+          <p:nvPr/>
+        </p:nvSpPr>
+        <p:spPr>
+          <a:xfrm>
+            <a:off x="650" y="479360"/>
+            <a:ext cx="12179286" cy="438"/>
+          </a:xfrm>
+          <a:custGeom>
+            <a:avLst/>
+            <a:gdLst/>
+            <a:ahLst/>
+            <a:cxnLst/>
+            <a:rect l="l" t="t" r="r" b="b"/>
+            <a:pathLst>
+              <a:path w="10070465" h="1904" extrusionOk="0">
+                <a:moveTo>
+                  <a:pt x="0" y="0"/>
+                </a:moveTo>
+                <a:lnTo>
+                  <a:pt x="10070084" y="1524"/>
+                </a:lnTo>
+              </a:path>
+            </a:pathLst>
+          </a:custGeom>
+          <a:noFill/>
+          <a:ln w="9525" cap="flat" cmpd="sng">
+            <a:solidFill>
+              <a:srgbClr val="000000"/>
+            </a:solidFill>
+            <a:prstDash val="solid"/>
+            <a:round/>
+            <a:headEnd type="none" w="sm" len="sm"/>
+            <a:tailEnd type="none" w="sm" len="sm"/>
+          </a:ln>
+        </p:spPr>
+      </p:sp>
+      <p:sp>
+        <p:nvSpPr>
+          <p:cNvPr id="90" name="Google Shape;90;g2009b74a80d_0_138">
+            <a:extLst>
+              <a:ext uri="{FF2B5EF4-FFF2-40B4-BE49-F238E27FC236}">
+                <a16:creationId xmlns:a16="http://schemas.microsoft.com/office/drawing/2014/main" id="{60328EEA-92F8-7EDB-69F7-D2E9E844FE33}"/>
+              </a:ext>
+            </a:extLst>
+          </p:cNvPr>
+          <p:cNvSpPr/>
+          <p:nvPr/>
+        </p:nvSpPr>
+        <p:spPr>
+          <a:xfrm>
+            <a:off x="426892" y="86207"/>
+            <a:ext cx="1576099" cy="306947"/>
+          </a:xfrm>
+          <a:prstGeom prst="rect">
+            <a:avLst/>
+          </a:prstGeom>
+          <a:noFill/>
+          <a:ln>
+            <a:noFill/>
+          </a:ln>
+        </p:spPr>
+        <p:txBody>
+          <a:bodyPr spcFirstLastPara="1" wrap="square" lIns="0" tIns="14785" rIns="0" bIns="0" anchor="t" anchorCtr="0">
+            <a:noAutofit/>
+          </a:bodyPr>
+          <a:lstStyle/>
+          <a:p>
+            <a:pPr marL="15237">
+              <a:buClr>
+                <a:srgbClr val="000000"/>
+              </a:buClr>
+              <a:buSzPts val="1600"/>
+            </a:pPr>
+            <a:r>
+              <a:rPr lang="en-IN" sz="1935" b="1" i="1" dirty="0">
+                <a:solidFill>
+                  <a:srgbClr val="CCCCCC"/>
+                </a:solidFill>
+                <a:latin typeface="Arial"/>
+                <a:ea typeface="Arial"/>
+                <a:cs typeface="Arial"/>
+                <a:sym typeface="Arial"/>
+              </a:rPr>
+              <a:t>Introduction</a:t>
+            </a:r>
+            <a:endParaRPr sz="1935" dirty="0">
+              <a:solidFill>
+                <a:srgbClr val="000000"/>
+              </a:solidFill>
+              <a:latin typeface="Arial"/>
+              <a:ea typeface="Arial"/>
+              <a:cs typeface="Arial"/>
+              <a:sym typeface="Arial"/>
+            </a:endParaRPr>
+          </a:p>
+        </p:txBody>
+      </p:sp>
+      <p:sp>
+        <p:nvSpPr>
+          <p:cNvPr id="91" name="Google Shape;91;g2009b74a80d_0_138">
+            <a:extLst>
+              <a:ext uri="{FF2B5EF4-FFF2-40B4-BE49-F238E27FC236}">
+                <a16:creationId xmlns:a16="http://schemas.microsoft.com/office/drawing/2014/main" id="{A8912C3B-1B0E-7C10-B6B3-5261672A104C}"/>
+              </a:ext>
+            </a:extLst>
+          </p:cNvPr>
+          <p:cNvSpPr/>
+          <p:nvPr/>
+        </p:nvSpPr>
+        <p:spPr>
+          <a:xfrm>
+            <a:off x="5224850" y="87077"/>
+            <a:ext cx="1705263" cy="306947"/>
+          </a:xfrm>
+          <a:prstGeom prst="rect">
+            <a:avLst/>
+          </a:prstGeom>
+          <a:noFill/>
+          <a:ln>
+            <a:noFill/>
+          </a:ln>
+        </p:spPr>
+        <p:txBody>
+          <a:bodyPr spcFirstLastPara="1" wrap="square" lIns="0" tIns="14785" rIns="0" bIns="0" anchor="t" anchorCtr="0">
+            <a:noAutofit/>
+          </a:bodyPr>
+          <a:lstStyle/>
+          <a:p>
+            <a:pPr marL="15237">
+              <a:buClr>
+                <a:srgbClr val="000000"/>
+              </a:buClr>
+              <a:buSzPts val="1600"/>
+            </a:pPr>
+            <a:r>
+              <a:rPr lang="en-IN" sz="1935" b="1" i="1" dirty="0">
+                <a:solidFill>
+                  <a:srgbClr val="CCCCCC"/>
+                </a:solidFill>
+                <a:latin typeface="Arial"/>
+                <a:ea typeface="Arial"/>
+                <a:cs typeface="Arial"/>
+                <a:sym typeface="Arial"/>
+              </a:rPr>
+              <a:t>Methodology</a:t>
+            </a:r>
+            <a:endParaRPr sz="1935" dirty="0">
+              <a:solidFill>
+                <a:srgbClr val="000000"/>
+              </a:solidFill>
+              <a:latin typeface="Arial"/>
+              <a:ea typeface="Arial"/>
+              <a:cs typeface="Arial"/>
+              <a:sym typeface="Arial"/>
+            </a:endParaRPr>
+          </a:p>
+        </p:txBody>
+      </p:sp>
+      <p:sp>
+        <p:nvSpPr>
+          <p:cNvPr id="92" name="Google Shape;92;g2009b74a80d_0_138">
+            <a:extLst>
+              <a:ext uri="{FF2B5EF4-FFF2-40B4-BE49-F238E27FC236}">
+                <a16:creationId xmlns:a16="http://schemas.microsoft.com/office/drawing/2014/main" id="{4301DA9E-678B-3F48-CF15-5BA32C76C3D5}"/>
+              </a:ext>
+            </a:extLst>
+          </p:cNvPr>
+          <p:cNvSpPr/>
+          <p:nvPr/>
+        </p:nvSpPr>
+        <p:spPr>
+          <a:xfrm>
+            <a:off x="2699609" y="87077"/>
+            <a:ext cx="1739368" cy="306947"/>
+          </a:xfrm>
+          <a:prstGeom prst="rect">
+            <a:avLst/>
+          </a:prstGeom>
+          <a:noFill/>
+          <a:ln>
+            <a:noFill/>
+          </a:ln>
+        </p:spPr>
+        <p:txBody>
+          <a:bodyPr spcFirstLastPara="1" wrap="square" lIns="0" tIns="14785" rIns="0" bIns="0" anchor="t" anchorCtr="0">
+            <a:noAutofit/>
+          </a:bodyPr>
+          <a:lstStyle/>
+          <a:p>
+            <a:pPr marL="15237">
+              <a:buClr>
+                <a:srgbClr val="000000"/>
+              </a:buClr>
+              <a:buSzPts val="1600"/>
+            </a:pPr>
+            <a:r>
+              <a:rPr lang="en-IN" sz="1935" b="1" i="1" dirty="0">
+                <a:solidFill>
+                  <a:srgbClr val="CCCCCC"/>
+                </a:solidFill>
+                <a:latin typeface="Arial"/>
+                <a:ea typeface="Arial"/>
+                <a:cs typeface="Arial"/>
+                <a:sym typeface="Arial"/>
+              </a:rPr>
+              <a:t>Specific  Aims</a:t>
+            </a:r>
+            <a:endParaRPr sz="1935" dirty="0">
+              <a:solidFill>
+                <a:srgbClr val="000000"/>
+              </a:solidFill>
+              <a:latin typeface="Arial"/>
+              <a:ea typeface="Arial"/>
+              <a:cs typeface="Arial"/>
+              <a:sym typeface="Arial"/>
+            </a:endParaRPr>
+          </a:p>
+        </p:txBody>
+      </p:sp>
+      <p:sp>
+        <p:nvSpPr>
+          <p:cNvPr id="93" name="Google Shape;93;g2009b74a80d_0_138">
+            <a:extLst>
+              <a:ext uri="{FF2B5EF4-FFF2-40B4-BE49-F238E27FC236}">
+                <a16:creationId xmlns:a16="http://schemas.microsoft.com/office/drawing/2014/main" id="{96F93EEA-6DE3-655E-63FB-EF83DDC47DBF}"/>
+              </a:ext>
+            </a:extLst>
+          </p:cNvPr>
+          <p:cNvSpPr/>
+          <p:nvPr/>
+        </p:nvSpPr>
+        <p:spPr>
+          <a:xfrm>
+            <a:off x="8132360" y="87077"/>
+            <a:ext cx="1531109" cy="306947"/>
+          </a:xfrm>
+          <a:prstGeom prst="rect">
+            <a:avLst/>
+          </a:prstGeom>
+          <a:noFill/>
+          <a:ln>
+            <a:noFill/>
+          </a:ln>
+        </p:spPr>
+        <p:txBody>
+          <a:bodyPr spcFirstLastPara="1" wrap="square" lIns="0" tIns="14785" rIns="0" bIns="0" anchor="t" anchorCtr="0">
+            <a:noAutofit/>
+          </a:bodyPr>
+          <a:lstStyle/>
+          <a:p>
+            <a:pPr marL="15237">
+              <a:buClr>
+                <a:srgbClr val="000000"/>
+              </a:buClr>
+              <a:buSzPts val="1600"/>
+            </a:pPr>
+            <a:r>
+              <a:rPr lang="en-IN" sz="1935" b="1" i="1" dirty="0">
+                <a:solidFill>
+                  <a:srgbClr val="CCCCCC"/>
+                </a:solidFill>
+                <a:latin typeface="Arial"/>
+                <a:ea typeface="Arial"/>
+                <a:cs typeface="Arial"/>
+                <a:sym typeface="Arial"/>
+              </a:rPr>
+              <a:t>Results</a:t>
+            </a:r>
+            <a:endParaRPr sz="1935" dirty="0">
+              <a:solidFill>
+                <a:srgbClr val="000000"/>
+              </a:solidFill>
+              <a:latin typeface="Arial"/>
+              <a:ea typeface="Arial"/>
+              <a:cs typeface="Arial"/>
+              <a:sym typeface="Arial"/>
+            </a:endParaRPr>
+          </a:p>
+        </p:txBody>
+      </p:sp>
+      <p:sp>
+        <p:nvSpPr>
+          <p:cNvPr id="94" name="Google Shape;94;g2009b74a80d_0_138">
+            <a:extLst>
+              <a:ext uri="{FF2B5EF4-FFF2-40B4-BE49-F238E27FC236}">
+                <a16:creationId xmlns:a16="http://schemas.microsoft.com/office/drawing/2014/main" id="{C034FBAB-1317-CD1C-8035-DD71D1490B73}"/>
+              </a:ext>
+            </a:extLst>
+          </p:cNvPr>
+          <p:cNvSpPr/>
+          <p:nvPr/>
+        </p:nvSpPr>
+        <p:spPr>
+          <a:xfrm>
+            <a:off x="10275331" y="87077"/>
+            <a:ext cx="1531109" cy="306947"/>
+          </a:xfrm>
+          <a:prstGeom prst="rect">
+            <a:avLst/>
+          </a:prstGeom>
+          <a:noFill/>
+          <a:ln>
+            <a:noFill/>
+          </a:ln>
+        </p:spPr>
+        <p:txBody>
+          <a:bodyPr spcFirstLastPara="1" wrap="square" lIns="0" tIns="14785" rIns="0" bIns="0" anchor="t" anchorCtr="0">
+            <a:noAutofit/>
+          </a:bodyPr>
+          <a:lstStyle/>
+          <a:p>
+            <a:pPr marL="15237">
+              <a:buClr>
+                <a:srgbClr val="000000"/>
+              </a:buClr>
+              <a:buSzPts val="1600"/>
+            </a:pPr>
+            <a:r>
+              <a:rPr lang="en-IN" sz="1935" b="1" i="1" dirty="0">
+                <a:solidFill>
+                  <a:srgbClr val="666666"/>
+                </a:solidFill>
+                <a:latin typeface="Arial"/>
+                <a:ea typeface="Arial"/>
+                <a:cs typeface="Arial"/>
+                <a:sym typeface="Arial"/>
+              </a:rPr>
+              <a:t>Future Work</a:t>
+            </a:r>
+            <a:endParaRPr sz="1935" dirty="0">
+              <a:solidFill>
+                <a:srgbClr val="000000"/>
+              </a:solidFill>
+              <a:latin typeface="Arial"/>
+              <a:ea typeface="Arial"/>
+              <a:cs typeface="Arial"/>
+              <a:sym typeface="Arial"/>
+            </a:endParaRPr>
+          </a:p>
+        </p:txBody>
+      </p:sp>
+      <p:sp>
+        <p:nvSpPr>
+          <p:cNvPr id="95" name="Google Shape;95;g2009b74a80d_0_138">
+            <a:extLst>
+              <a:ext uri="{FF2B5EF4-FFF2-40B4-BE49-F238E27FC236}">
+                <a16:creationId xmlns:a16="http://schemas.microsoft.com/office/drawing/2014/main" id="{106A02D3-DF64-95BF-65F4-2DB8CFAB11D4}"/>
+              </a:ext>
+            </a:extLst>
+          </p:cNvPr>
+          <p:cNvSpPr/>
+          <p:nvPr/>
+        </p:nvSpPr>
+        <p:spPr>
+          <a:xfrm>
+            <a:off x="0" y="629409"/>
+            <a:ext cx="12192000" cy="674486"/>
+          </a:xfrm>
+          <a:prstGeom prst="rect">
+            <a:avLst/>
+          </a:prstGeom>
+          <a:noFill/>
+          <a:ln>
+            <a:noFill/>
+          </a:ln>
+        </p:spPr>
+        <p:txBody>
+          <a:bodyPr spcFirstLastPara="1" wrap="square" lIns="0" tIns="14785" rIns="0" bIns="0" anchor="ctr" anchorCtr="0">
+            <a:noAutofit/>
+          </a:bodyPr>
+          <a:lstStyle/>
+          <a:p>
+            <a:pPr marL="15237" algn="ctr">
+              <a:buClr>
+                <a:srgbClr val="000000"/>
+              </a:buClr>
+              <a:buSzPts val="2800"/>
+            </a:pPr>
+            <a:r>
+              <a:rPr lang="en-IN" sz="3200" b="1" dirty="0">
+                <a:solidFill>
+                  <a:srgbClr val="1F2ED4"/>
+                </a:solidFill>
+                <a:latin typeface="Arial"/>
+                <a:ea typeface="Arial"/>
+                <a:cs typeface="Arial"/>
+                <a:sym typeface="Arial"/>
+              </a:rPr>
+              <a:t>A molecular signal-hypothesis vs. a biophysical explanation</a:t>
+            </a:r>
+            <a:endParaRPr sz="3200" dirty="0">
+              <a:solidFill>
+                <a:srgbClr val="000000"/>
+              </a:solidFill>
+              <a:latin typeface="Arial"/>
+              <a:ea typeface="Arial"/>
+              <a:cs typeface="Arial"/>
+              <a:sym typeface="Arial"/>
+            </a:endParaRPr>
+          </a:p>
+        </p:txBody>
+      </p:sp>
+      <p:sp>
+        <p:nvSpPr>
+          <p:cNvPr id="96" name="Google Shape;96;g2009b74a80d_0_138">
+            <a:extLst>
+              <a:ext uri="{FF2B5EF4-FFF2-40B4-BE49-F238E27FC236}">
+                <a16:creationId xmlns:a16="http://schemas.microsoft.com/office/drawing/2014/main" id="{5364D065-FC1D-EC7B-CB7F-E9A3B25C43BA}"/>
+              </a:ext>
+            </a:extLst>
+          </p:cNvPr>
+          <p:cNvSpPr/>
+          <p:nvPr/>
+        </p:nvSpPr>
+        <p:spPr>
+          <a:xfrm>
+            <a:off x="11493542" y="6356641"/>
+            <a:ext cx="436112" cy="350486"/>
+          </a:xfrm>
+          <a:prstGeom prst="rect">
+            <a:avLst/>
+          </a:prstGeom>
+          <a:noFill/>
+          <a:ln>
+            <a:noFill/>
+          </a:ln>
+        </p:spPr>
+        <p:txBody>
+          <a:bodyPr spcFirstLastPara="1" wrap="square" lIns="108847" tIns="54423" rIns="108847" bIns="54423" anchor="t" anchorCtr="0">
+            <a:noAutofit/>
+          </a:bodyPr>
+          <a:lstStyle/>
+          <a:p>
+            <a:pPr>
+              <a:buClr>
+                <a:srgbClr val="000000"/>
+              </a:buClr>
+              <a:buSzPts val="1400"/>
+            </a:pPr>
+            <a:endParaRPr sz="1693">
+              <a:solidFill>
+                <a:srgbClr val="000000"/>
+              </a:solidFill>
+              <a:latin typeface="Arial"/>
+              <a:ea typeface="Arial"/>
+              <a:cs typeface="Arial"/>
+              <a:sym typeface="Arial"/>
+            </a:endParaRPr>
+          </a:p>
+        </p:txBody>
+      </p:sp>
+      <p:sp>
+        <p:nvSpPr>
+          <p:cNvPr id="97" name="Google Shape;97;g2009b74a80d_0_138">
+            <a:extLst>
+              <a:ext uri="{FF2B5EF4-FFF2-40B4-BE49-F238E27FC236}">
+                <a16:creationId xmlns:a16="http://schemas.microsoft.com/office/drawing/2014/main" id="{D178A29C-E9AF-F285-05E3-F71B53E4129D}"/>
+              </a:ext>
+            </a:extLst>
+          </p:cNvPr>
+          <p:cNvSpPr txBox="1">
+            <a:spLocks noGrp="1"/>
+          </p:cNvSpPr>
+          <p:nvPr>
+            <p:ph type="sldNum" idx="12"/>
+          </p:nvPr>
+        </p:nvSpPr>
+        <p:spPr>
+          <a:xfrm>
+            <a:off x="11408860" y="6333135"/>
+            <a:ext cx="731449" cy="525003"/>
+          </a:xfrm>
+          <a:prstGeom prst="rect">
+            <a:avLst/>
+          </a:prstGeom>
+          <a:noFill/>
+          <a:ln>
+            <a:noFill/>
+          </a:ln>
+        </p:spPr>
+        <p:txBody>
+          <a:bodyPr spcFirstLastPara="1" vert="horz" wrap="square" lIns="110570" tIns="110570" rIns="110570" bIns="110570" rtlCol="0" anchor="t" anchorCtr="0">
+            <a:noAutofit/>
+          </a:bodyPr>
+          <a:lstStyle/>
+          <a:p>
+            <a:pPr>
+              <a:buSzPts val="1300"/>
+            </a:pPr>
+            <a:fld id="{00000000-1234-1234-1234-123412341234}" type="slidenum">
+              <a:rPr lang="en-IN" smtClean="0"/>
+              <a:pPr>
+                <a:buSzPts val="1300"/>
+              </a:pPr>
+              <a:t>9</a:t>
+            </a:fld>
+            <a:r>
+              <a:rPr lang="en-IN" dirty="0"/>
+              <a:t>/9</a:t>
             </a:r>
             <a:endParaRPr dirty="0"/>
           </a:p>
@@ -9576,7 +12572,7 @@
                 <a:cs typeface="Arial"/>
                 <a:sym typeface="Arial"/>
               </a:rPr>
-              <a:t>Below is a ChatGPT-ed list of possible ways in which translocations could potentially take place in the human nuclear genome. The molecular-signal hypothesis is that the proteins involved in some of these pathways will show up as their corresponding binding sites when we </a:t>
+              <a:t>A molecular signal hypothesis – look at all known mechanisms in which translocations could potentially take place in the human nuclear genome; proteins involved in some of these pathways will hopefully show up as their corresponding binding sites when we </a:t>
             </a:r>
             <a:r>
               <a:rPr lang="en-US" dirty="0" err="1">
@@ -9592,7 +12588,7 @@
                 <a:cs typeface="Arial"/>
                 <a:sym typeface="Arial"/>
               </a:rPr>
-              <a:t> the motif vectors obtained.</a:t>
+              <a:t> the motif vectors obtained from the sequences.</a:t>
             </a:r>
           </a:p>
           <a:p>
@@ -9616,7 +12612,7 @@
                 <a:sym typeface="Arial"/>
                 <a:hlinkClick r:id="rId3"/>
               </a:rPr>
-              <a:t>Link to .md file</a:t>
+              <a:t>Link</a:t>
             </a:r>
             <a:r>
               <a:rPr lang="en-US" dirty="0">

</xml_diff>